<commit_message>
Some fixes in the introduction presentation. Added required software.
</commit_message>
<xml_diff>
--- a/Lectures/0. Course Introduction/ASP.NET-MVC-Course-Introduction.pptx
+++ b/Lectures/0. Course Introduction/ASP.NET-MVC-Course-Introduction.pptx
@@ -5,10 +5,10 @@
     <p:sldMasterId id="2147483704" r:id="rId1"/>
   </p:sldMasterIdLst>
   <p:notesMasterIdLst>
-    <p:notesMasterId r:id="rId34"/>
+    <p:notesMasterId r:id="rId35"/>
   </p:notesMasterIdLst>
   <p:handoutMasterIdLst>
-    <p:handoutMasterId r:id="rId35"/>
+    <p:handoutMasterId r:id="rId36"/>
   </p:handoutMasterIdLst>
   <p:sldIdLst>
     <p:sldId id="320" r:id="rId2"/>
@@ -19,30 +19,31 @@
     <p:sldId id="371" r:id="rId7"/>
     <p:sldId id="322" r:id="rId8"/>
     <p:sldId id="323" r:id="rId9"/>
-    <p:sldId id="358" r:id="rId10"/>
-    <p:sldId id="351" r:id="rId11"/>
-    <p:sldId id="324" r:id="rId12"/>
-    <p:sldId id="325" r:id="rId13"/>
-    <p:sldId id="347" r:id="rId14"/>
-    <p:sldId id="348" r:id="rId15"/>
-    <p:sldId id="349" r:id="rId16"/>
-    <p:sldId id="328" r:id="rId17"/>
-    <p:sldId id="329" r:id="rId18"/>
-    <p:sldId id="362" r:id="rId19"/>
-    <p:sldId id="363" r:id="rId20"/>
-    <p:sldId id="364" r:id="rId21"/>
-    <p:sldId id="365" r:id="rId22"/>
-    <p:sldId id="373" r:id="rId23"/>
-    <p:sldId id="366" r:id="rId24"/>
-    <p:sldId id="339" r:id="rId25"/>
-    <p:sldId id="340" r:id="rId26"/>
-    <p:sldId id="367" r:id="rId27"/>
-    <p:sldId id="350" r:id="rId28"/>
-    <p:sldId id="343" r:id="rId29"/>
-    <p:sldId id="344" r:id="rId30"/>
-    <p:sldId id="345" r:id="rId31"/>
-    <p:sldId id="359" r:id="rId32"/>
-    <p:sldId id="346" r:id="rId33"/>
+    <p:sldId id="375" r:id="rId10"/>
+    <p:sldId id="358" r:id="rId11"/>
+    <p:sldId id="351" r:id="rId12"/>
+    <p:sldId id="324" r:id="rId13"/>
+    <p:sldId id="325" r:id="rId14"/>
+    <p:sldId id="347" r:id="rId15"/>
+    <p:sldId id="348" r:id="rId16"/>
+    <p:sldId id="349" r:id="rId17"/>
+    <p:sldId id="328" r:id="rId18"/>
+    <p:sldId id="329" r:id="rId19"/>
+    <p:sldId id="362" r:id="rId20"/>
+    <p:sldId id="363" r:id="rId21"/>
+    <p:sldId id="364" r:id="rId22"/>
+    <p:sldId id="365" r:id="rId23"/>
+    <p:sldId id="373" r:id="rId24"/>
+    <p:sldId id="366" r:id="rId25"/>
+    <p:sldId id="339" r:id="rId26"/>
+    <p:sldId id="340" r:id="rId27"/>
+    <p:sldId id="367" r:id="rId28"/>
+    <p:sldId id="350" r:id="rId29"/>
+    <p:sldId id="343" r:id="rId30"/>
+    <p:sldId id="344" r:id="rId31"/>
+    <p:sldId id="345" r:id="rId32"/>
+    <p:sldId id="359" r:id="rId33"/>
+    <p:sldId id="346" r:id="rId34"/>
   </p:sldIdLst>
   <p:sldSz cx="9144000" cy="6858000" type="screen4x3"/>
   <p:notesSz cx="6881813" cy="9296400"/>
@@ -289,7 +290,7 @@
             <a:fld id="{3BF7C7B5-275F-4D1F-9AB4-9255447DBC73}" type="datetimeFigureOut">
               <a:rPr lang="en-US"/>
               <a:pPr/>
-              <a:t>10-Oct-11</a:t>
+              <a:t>11-Oct-11</a:t>
             </a:fld>
             <a:endParaRPr lang="en-US" dirty="0"/>
           </a:p>
@@ -520,7 +521,7 @@
             <a:fld id="{9B46F231-FB2B-4655-A644-E2477325E686}" type="datetimeFigureOut">
               <a:rPr lang="en-US"/>
               <a:pPr/>
-              <a:t>10-Oct-11</a:t>
+              <a:t>11-Oct-11</a:t>
             </a:fld>
             <a:endParaRPr lang="en-US" dirty="0"/>
           </a:p>
@@ -5574,11 +5575,7 @@
           <a:p>
             <a:r>
               <a:rPr lang="en-US" sz="4800" smtClean="0"/>
-              <a:t>Web </a:t>
-            </a:r>
-            <a:r>
-              <a:rPr lang="en-US" sz="4800" smtClean="0"/>
-              <a:t>Applications</a:t>
+              <a:t>Web Applications</a:t>
             </a:r>
             <a:br>
               <a:rPr lang="en-US" sz="4800" smtClean="0"/>
@@ -5811,6 +5808,404 @@
       </p:grpSpPr>
       <p:sp>
         <p:nvSpPr>
+          <p:cNvPr id="2" name="Title 1"/>
+          <p:cNvSpPr>
+            <a:spLocks noGrp="1"/>
+          </p:cNvSpPr>
+          <p:nvPr>
+            <p:ph type="title"/>
+          </p:nvPr>
+        </p:nvSpPr>
+        <p:spPr/>
+        <p:txBody>
+          <a:bodyPr/>
+          <a:lstStyle/>
+          <a:p>
+            <a:r>
+              <a:rPr lang="en-US" dirty="0" smtClean="0"/>
+              <a:t>Registration</a:t>
+            </a:r>
+            <a:endParaRPr lang="en-US" dirty="0"/>
+          </a:p>
+        </p:txBody>
+      </p:sp>
+      <p:sp>
+        <p:nvSpPr>
+          <p:cNvPr id="3" name="Content Placeholder 2"/>
+          <p:cNvSpPr>
+            <a:spLocks noGrp="1"/>
+          </p:cNvSpPr>
+          <p:nvPr>
+            <p:ph idx="1"/>
+          </p:nvPr>
+        </p:nvSpPr>
+        <p:spPr>
+          <a:xfrm>
+            <a:off x="228600" y="838200"/>
+            <a:ext cx="8686800" cy="5638800"/>
+          </a:xfrm>
+        </p:spPr>
+        <p:txBody>
+          <a:bodyPr/>
+          <a:lstStyle/>
+          <a:p>
+            <a:pPr>
+              <a:lnSpc>
+                <a:spcPct val="100000"/>
+              </a:lnSpc>
+            </a:pPr>
+            <a:r>
+              <a:rPr lang="en-US" dirty="0" smtClean="0"/>
+              <a:t>All students should register for the course at:</a:t>
+            </a:r>
+          </a:p>
+          <a:p>
+            <a:pPr marL="0" indent="0" algn="ctr">
+              <a:lnSpc>
+                <a:spcPct val="100000"/>
+              </a:lnSpc>
+              <a:buNone/>
+            </a:pPr>
+            <a:endParaRPr lang="en-US" sz="4400" dirty="0" smtClean="0"/>
+          </a:p>
+          <a:p>
+            <a:pPr lvl="0">
+              <a:lnSpc>
+                <a:spcPct val="100000"/>
+              </a:lnSpc>
+              <a:spcBef>
+                <a:spcPts val="1800"/>
+              </a:spcBef>
+              <a:buClr>
+                <a:srgbClr val="46A6BD">
+                  <a:lumMod val="40000"/>
+                  <a:lumOff val="60000"/>
+                </a:srgbClr>
+              </a:buClr>
+            </a:pPr>
+            <a:r>
+              <a:rPr lang="en-US" dirty="0" smtClean="0"/>
+              <a:t>Registration is important!</a:t>
+            </a:r>
+          </a:p>
+          <a:p>
+            <a:pPr lvl="1">
+              <a:lnSpc>
+                <a:spcPct val="100000"/>
+              </a:lnSpc>
+              <a:buClr>
+                <a:srgbClr val="46A6BD">
+                  <a:lumMod val="40000"/>
+                  <a:lumOff val="60000"/>
+                </a:srgbClr>
+              </a:buClr>
+            </a:pPr>
+            <a:r>
+              <a:rPr lang="en-US" dirty="0" smtClean="0"/>
+              <a:t>Registration allows the trainers contact you regarding the course projects, exams, etc.</a:t>
+            </a:r>
+          </a:p>
+          <a:p>
+            <a:pPr lvl="1">
+              <a:lnSpc>
+                <a:spcPct val="100000"/>
+              </a:lnSpc>
+              <a:buClr>
+                <a:srgbClr val="46A6BD">
+                  <a:lumMod val="40000"/>
+                  <a:lumOff val="60000"/>
+                </a:srgbClr>
+              </a:buClr>
+            </a:pPr>
+            <a:r>
+              <a:rPr lang="en-US" dirty="0" smtClean="0"/>
+              <a:t>Registered students are assigned to work on one of the course projects</a:t>
+            </a:r>
+          </a:p>
+          <a:p>
+            <a:pPr lvl="0">
+              <a:lnSpc>
+                <a:spcPct val="100000"/>
+              </a:lnSpc>
+              <a:buClr>
+                <a:srgbClr val="46A6BD">
+                  <a:lumMod val="40000"/>
+                  <a:lumOff val="60000"/>
+                </a:srgbClr>
+              </a:buClr>
+            </a:pPr>
+            <a:r>
+              <a:rPr lang="en-US" dirty="0"/>
+              <a:t>If you have any questions you can contact us</a:t>
+            </a:r>
+            <a:r>
+              <a:rPr lang="en-US" dirty="0" smtClean="0"/>
+              <a:t>:</a:t>
+            </a:r>
+            <a:endParaRPr lang="en-US" dirty="0"/>
+          </a:p>
+        </p:txBody>
+      </p:sp>
+      <p:sp>
+        <p:nvSpPr>
+          <p:cNvPr id="4" name="Slide Number Placeholder 3"/>
+          <p:cNvSpPr>
+            <a:spLocks noGrp="1"/>
+          </p:cNvSpPr>
+          <p:nvPr>
+            <p:ph type="sldNum" sz="quarter" idx="10"/>
+          </p:nvPr>
+        </p:nvSpPr>
+        <p:spPr/>
+        <p:txBody>
+          <a:bodyPr/>
+          <a:lstStyle/>
+          <a:p>
+            <a:pPr>
+              <a:defRPr/>
+            </a:pPr>
+            <a:fld id="{58452FF4-89E3-4D1B-9927-2DBDC00E58D7}" type="slidenum">
+              <a:rPr lang="en-US" smtClean="0"/>
+              <a:pPr>
+                <a:defRPr/>
+              </a:pPr>
+              <a:t>10</a:t>
+            </a:fld>
+            <a:endParaRPr lang="en-US" dirty="0"/>
+          </a:p>
+        </p:txBody>
+      </p:sp>
+      <p:sp>
+        <p:nvSpPr>
+          <p:cNvPr id="5" name="Rounded Rectangle 4"/>
+          <p:cNvSpPr/>
+          <p:nvPr/>
+        </p:nvSpPr>
+        <p:spPr>
+          <a:xfrm>
+            <a:off x="914400" y="1514354"/>
+            <a:ext cx="7315200" cy="821130"/>
+          </a:xfrm>
+          <a:prstGeom prst="roundRect">
+            <a:avLst>
+              <a:gd name="adj" fmla="val 8117"/>
+            </a:avLst>
+          </a:prstGeom>
+          <a:solidFill>
+            <a:schemeClr val="accent5">
+              <a:lumMod val="40000"/>
+              <a:lumOff val="60000"/>
+              <a:alpha val="15000"/>
+            </a:schemeClr>
+          </a:solidFill>
+          <a:ln w="12700">
+            <a:solidFill>
+              <a:schemeClr val="accent5">
+                <a:lumMod val="60000"/>
+                <a:lumOff val="40000"/>
+              </a:schemeClr>
+            </a:solidFill>
+          </a:ln>
+        </p:spPr>
+        <p:txBody>
+          <a:bodyPr wrap="square" tIns="108000" bIns="180000" anchor="ctr" anchorCtr="0">
+            <a:spAutoFit/>
+          </a:bodyPr>
+          <a:lstStyle/>
+          <a:p>
+            <a:pPr algn="ctr" eaLnBrk="0" hangingPunct="0">
+              <a:spcBef>
+                <a:spcPts val="0"/>
+              </a:spcBef>
+              <a:buClr>
+                <a:schemeClr val="accent5">
+                  <a:lumMod val="40000"/>
+                  <a:lumOff val="60000"/>
+                </a:schemeClr>
+              </a:buClr>
+              <a:buSzPct val="70000"/>
+              <a:buFont typeface="Wingdings 2" pitchFamily="18" charset="2"/>
+              <a:buNone/>
+            </a:pPr>
+            <a:r>
+              <a:rPr lang="en-US" sz="3200" b="1" dirty="0">
+                <a:solidFill>
+                  <a:srgbClr val="8CF4F2"/>
+                </a:solidFill>
+                <a:effectLst>
+                  <a:outerShdw blurRad="38100" dist="38100" dir="2700000" algn="tl">
+                    <a:srgbClr val="000000">
+                      <a:alpha val="43137"/>
+                    </a:srgbClr>
+                  </a:outerShdw>
+                </a:effectLst>
+                <a:latin typeface="Consolas" pitchFamily="49" charset="0"/>
+                <a:cs typeface="Consolas" pitchFamily="49" charset="0"/>
+                <a:hlinkClick r:id="rId2"/>
+              </a:rPr>
+              <a:t>http://</a:t>
+            </a:r>
+            <a:r>
+              <a:rPr lang="en-US" sz="3200" b="1" dirty="0" smtClean="0">
+                <a:solidFill>
+                  <a:srgbClr val="8CF4F2"/>
+                </a:solidFill>
+                <a:effectLst>
+                  <a:outerShdw blurRad="38100" dist="38100" dir="2700000" algn="tl">
+                    <a:srgbClr val="000000">
+                      <a:alpha val="43137"/>
+                    </a:srgbClr>
+                  </a:outerShdw>
+                </a:effectLst>
+                <a:latin typeface="Consolas" pitchFamily="49" charset="0"/>
+                <a:cs typeface="Consolas" pitchFamily="49" charset="0"/>
+                <a:hlinkClick r:id="rId2"/>
+              </a:rPr>
+              <a:t>mvccourse.telerik.com</a:t>
+            </a:r>
+            <a:endParaRPr lang="en-US" sz="3200" b="1" dirty="0">
+              <a:solidFill>
+                <a:srgbClr val="8CF4F2"/>
+              </a:solidFill>
+              <a:effectLst>
+                <a:outerShdw blurRad="38100" dist="38100" dir="2700000" algn="tl">
+                  <a:srgbClr val="000000">
+                    <a:alpha val="43137"/>
+                  </a:srgbClr>
+                </a:outerShdw>
+              </a:effectLst>
+              <a:latin typeface="Consolas" pitchFamily="49" charset="0"/>
+              <a:cs typeface="Consolas" pitchFamily="49" charset="0"/>
+            </a:endParaRPr>
+          </a:p>
+        </p:txBody>
+      </p:sp>
+      <p:sp>
+        <p:nvSpPr>
+          <p:cNvPr id="6" name="Rounded Rectangle 5"/>
+          <p:cNvSpPr/>
+          <p:nvPr/>
+        </p:nvSpPr>
+        <p:spPr>
+          <a:xfrm>
+            <a:off x="914400" y="5905492"/>
+            <a:ext cx="7315200" cy="680379"/>
+          </a:xfrm>
+          <a:prstGeom prst="roundRect">
+            <a:avLst>
+              <a:gd name="adj" fmla="val 8117"/>
+            </a:avLst>
+          </a:prstGeom>
+          <a:solidFill>
+            <a:schemeClr val="accent5">
+              <a:lumMod val="40000"/>
+              <a:lumOff val="60000"/>
+              <a:alpha val="15000"/>
+            </a:schemeClr>
+          </a:solidFill>
+          <a:ln w="12700">
+            <a:solidFill>
+              <a:schemeClr val="accent5">
+                <a:lumMod val="60000"/>
+                <a:lumOff val="40000"/>
+              </a:schemeClr>
+            </a:solidFill>
+          </a:ln>
+        </p:spPr>
+        <p:txBody>
+          <a:bodyPr wrap="square" tIns="72000" bIns="144000" anchor="ctr" anchorCtr="0">
+            <a:spAutoFit/>
+          </a:bodyPr>
+          <a:lstStyle/>
+          <a:p>
+            <a:pPr algn="ctr" eaLnBrk="0" hangingPunct="0">
+              <a:spcBef>
+                <a:spcPts val="0"/>
+              </a:spcBef>
+              <a:buClr>
+                <a:schemeClr val="accent5">
+                  <a:lumMod val="40000"/>
+                  <a:lumOff val="60000"/>
+                </a:schemeClr>
+              </a:buClr>
+              <a:buSzPct val="70000"/>
+              <a:buFont typeface="Wingdings 2" pitchFamily="18" charset="2"/>
+              <a:buNone/>
+            </a:pPr>
+            <a:r>
+              <a:rPr lang="en-US" sz="2800" b="1" dirty="0" smtClean="0">
+                <a:solidFill>
+                  <a:srgbClr val="8CF4F2"/>
+                </a:solidFill>
+                <a:effectLst>
+                  <a:outerShdw blurRad="38100" dist="38100" dir="2700000" algn="tl">
+                    <a:srgbClr val="000000">
+                      <a:alpha val="43137"/>
+                    </a:srgbClr>
+                  </a:outerShdw>
+                </a:effectLst>
+                <a:latin typeface="Consolas" pitchFamily="49" charset="0"/>
+                <a:cs typeface="Consolas" pitchFamily="49" charset="0"/>
+                <a:hlinkClick r:id="rId3"/>
+              </a:rPr>
+              <a:t>academy@telerik.com</a:t>
+            </a:r>
+            <a:endParaRPr lang="en-US" sz="2800" b="1" dirty="0">
+              <a:solidFill>
+                <a:srgbClr val="8CF4F2"/>
+              </a:solidFill>
+              <a:effectLst>
+                <a:outerShdw blurRad="38100" dist="38100" dir="2700000" algn="tl">
+                  <a:srgbClr val="000000">
+                    <a:alpha val="43137"/>
+                  </a:srgbClr>
+                </a:outerShdw>
+              </a:effectLst>
+              <a:latin typeface="Consolas" pitchFamily="49" charset="0"/>
+              <a:cs typeface="Consolas" pitchFamily="49" charset="0"/>
+            </a:endParaRPr>
+          </a:p>
+        </p:txBody>
+      </p:sp>
+    </p:spTree>
+    <p:extLst>
+      <p:ext uri="{BB962C8B-B14F-4D97-AF65-F5344CB8AC3E}">
+        <p14:creationId xmlns:p14="http://schemas.microsoft.com/office/powerpoint/2010/main" val="652486721"/>
+      </p:ext>
+    </p:extLst>
+  </p:cSld>
+  <p:clrMapOvr>
+    <a:masterClrMapping/>
+  </p:clrMapOvr>
+  <p:timing>
+    <p:tnLst>
+      <p:par>
+        <p:cTn id="1" dur="indefinite" restart="never" nodeType="tmRoot"/>
+      </p:par>
+    </p:tnLst>
+  </p:timing>
+</p:sld>
+</file>
+
+<file path=ppt/slides/slide11.xml><?xml version="1.0" encoding="utf-8"?>
+<p:sld xmlns:a="http://schemas.openxmlformats.org/drawingml/2006/main" xmlns:r="http://schemas.openxmlformats.org/officeDocument/2006/relationships" xmlns:p="http://schemas.openxmlformats.org/presentationml/2006/main">
+  <p:cSld>
+    <p:spTree>
+      <p:nvGrpSpPr>
+        <p:cNvPr id="1" name=""/>
+        <p:cNvGrpSpPr/>
+        <p:nvPr/>
+      </p:nvGrpSpPr>
+      <p:grpSpPr>
+        <a:xfrm>
+          <a:off x="0" y="0"/>
+          <a:ext cx="0" cy="0"/>
+          <a:chOff x="0" y="0"/>
+          <a:chExt cx="0" cy="0"/>
+        </a:xfrm>
+      </p:grpSpPr>
+      <p:sp>
+        <p:nvSpPr>
           <p:cNvPr id="4" name="Title 3"/>
           <p:cNvSpPr>
             <a:spLocks noGrp="1"/>
@@ -5961,7 +6356,11 @@
             </a:r>
             <a:r>
               <a:rPr lang="en-US" dirty="0"/>
-              <a:t>Academy – New Training Lab </a:t>
+              <a:t>Academy – New Training </a:t>
+            </a:r>
+            <a:r>
+              <a:rPr lang="en-US" dirty="0" smtClean="0"/>
+              <a:t>Lab</a:t>
             </a:r>
             <a:endParaRPr lang="en-US" dirty="0" smtClean="0"/>
           </a:p>
@@ -6021,8 +6420,9 @@
             </a:r>
             <a:r>
               <a:rPr lang="en-US" dirty="0" smtClean="0"/>
-              <a:t>, </a:t>
-            </a:r>
+              <a:t>,</a:t>
+            </a:r>
+            <a:endParaRPr lang="en-US" dirty="0" smtClean="0"/>
           </a:p>
           <a:p>
             <a:pPr lvl="1">
@@ -6040,8 +6440,59 @@
             </a:r>
             <a:r>
               <a:rPr lang="en-US" dirty="0" smtClean="0"/>
-              <a:t> October 2011</a:t>
-            </a:r>
+              <a:t> October </a:t>
+            </a:r>
+            <a:r>
+              <a:rPr lang="en-US" dirty="0" smtClean="0"/>
+              <a:t>2011</a:t>
+            </a:r>
+          </a:p>
+          <a:p>
+            <a:pPr lvl="1">
+              <a:lnSpc>
+                <a:spcPct val="110000"/>
+              </a:lnSpc>
+            </a:pPr>
+            <a:r>
+              <a:rPr lang="en-US" dirty="0" smtClean="0"/>
+              <a:t>Located in: </a:t>
+            </a:r>
+            <a:r>
+              <a:rPr lang="en-US" dirty="0" err="1" smtClean="0"/>
+              <a:t>Mladost</a:t>
+            </a:r>
+            <a:r>
+              <a:rPr lang="en-US" dirty="0" smtClean="0"/>
+              <a:t> 1A,</a:t>
+            </a:r>
+            <a:br>
+              <a:rPr lang="en-US" dirty="0" smtClean="0"/>
+            </a:br>
+            <a:r>
+              <a:rPr lang="en-US" dirty="0" smtClean="0"/>
+              <a:t>Alexander </a:t>
+            </a:r>
+            <a:r>
+              <a:rPr lang="en-US" dirty="0" err="1" smtClean="0"/>
+              <a:t>Malinov</a:t>
+            </a:r>
+            <a:r>
+              <a:rPr lang="en-US" dirty="0"/>
+              <a:t> </a:t>
+            </a:r>
+            <a:r>
+              <a:rPr lang="en-US" dirty="0" err="1" smtClean="0"/>
+              <a:t>blvd</a:t>
+            </a:r>
+            <a:r>
+              <a:rPr lang="en-US" dirty="0" err="1"/>
+              <a:t>.</a:t>
+            </a:r>
+            <a:r>
+              <a:rPr lang="en-US" dirty="0" smtClean="0"/>
+              <a:t> 31</a:t>
+            </a:r>
+            <a:endParaRPr lang="en-US" dirty="0" smtClean="0"/>
           </a:p>
         </p:txBody>
       </p:sp>
@@ -6068,7 +6519,7 @@
               <a:pPr>
                 <a:defRPr/>
               </a:pPr>
-              <a:t>10</a:t>
+              <a:t>11</a:t>
             </a:fld>
             <a:endParaRPr lang="en-US" dirty="0"/>
           </a:p>
@@ -6097,7 +6548,7 @@
         </p:blipFill>
         <p:spPr bwMode="auto">
           <a:xfrm>
-            <a:off x="5486400" y="4556294"/>
+            <a:off x="5562600" y="4495800"/>
             <a:ext cx="3124200" cy="1844506"/>
           </a:xfrm>
           <a:prstGeom prst="roundRect">
@@ -6136,7 +6587,7 @@
 </p:sld>
 </file>
 
-<file path=ppt/slides/slide11.xml><?xml version="1.0" encoding="utf-8"?>
+<file path=ppt/slides/slide12.xml><?xml version="1.0" encoding="utf-8"?>
 <p:sld xmlns:a="http://schemas.openxmlformats.org/drawingml/2006/main" xmlns:r="http://schemas.openxmlformats.org/officeDocument/2006/relationships" xmlns:p="http://schemas.openxmlformats.org/presentationml/2006/main">
   <p:cSld>
     <p:spTree>
@@ -6235,211 +6686,6 @@
 </p:sld>
 </file>
 
-<file path=ppt/slides/slide12.xml><?xml version="1.0" encoding="utf-8"?>
-<p:sld xmlns:a="http://schemas.openxmlformats.org/drawingml/2006/main" xmlns:r="http://schemas.openxmlformats.org/officeDocument/2006/relationships" xmlns:p="http://schemas.openxmlformats.org/presentationml/2006/main">
-  <p:cSld>
-    <p:spTree>
-      <p:nvGrpSpPr>
-        <p:cNvPr id="1" name=""/>
-        <p:cNvGrpSpPr/>
-        <p:nvPr/>
-      </p:nvGrpSpPr>
-      <p:grpSpPr>
-        <a:xfrm>
-          <a:off x="0" y="0"/>
-          <a:ext cx="0" cy="0"/>
-          <a:chOff x="0" y="0"/>
-          <a:chExt cx="0" cy="0"/>
-        </a:xfrm>
-      </p:grpSpPr>
-      <p:sp>
-        <p:nvSpPr>
-          <p:cNvPr id="2" name="Title 1"/>
-          <p:cNvSpPr>
-            <a:spLocks noGrp="1"/>
-          </p:cNvSpPr>
-          <p:nvPr>
-            <p:ph type="title"/>
-          </p:nvPr>
-        </p:nvSpPr>
-        <p:spPr/>
-        <p:txBody>
-          <a:bodyPr/>
-          <a:lstStyle/>
-          <a:p>
-            <a:r>
-              <a:rPr lang="en-US" dirty="0" smtClean="0"/>
-              <a:t>Curriculum</a:t>
-            </a:r>
-            <a:endParaRPr lang="en-US" dirty="0"/>
-          </a:p>
-        </p:txBody>
-      </p:sp>
-      <p:sp>
-        <p:nvSpPr>
-          <p:cNvPr id="3" name="Content Placeholder 2"/>
-          <p:cNvSpPr>
-            <a:spLocks noGrp="1"/>
-          </p:cNvSpPr>
-          <p:nvPr>
-            <p:ph idx="1"/>
-          </p:nvPr>
-        </p:nvSpPr>
-        <p:spPr>
-          <a:xfrm>
-            <a:off x="97808" y="914400"/>
-            <a:ext cx="8915400" cy="5791200"/>
-          </a:xfrm>
-        </p:spPr>
-        <p:txBody>
-          <a:bodyPr/>
-          <a:lstStyle/>
-          <a:p>
-            <a:pPr marL="361950" lvl="0" indent="-361950">
-              <a:lnSpc>
-                <a:spcPct val="95000"/>
-              </a:lnSpc>
-              <a:buFont typeface="+mj-lt"/>
-              <a:buAutoNum type="arabicPeriod"/>
-              <a:tabLst/>
-            </a:pPr>
-            <a:r>
-              <a:rPr lang="en-US" sz="3000" dirty="0" smtClean="0"/>
-              <a:t>.NET Framework Overview</a:t>
-            </a:r>
-          </a:p>
-          <a:p>
-            <a:pPr marL="520700" lvl="1" indent="-228600">
-              <a:lnSpc>
-                <a:spcPct val="95000"/>
-              </a:lnSpc>
-            </a:pPr>
-            <a:r>
-              <a:rPr lang="en-US" sz="2800" dirty="0" smtClean="0"/>
-              <a:t>.NET, CLR, MSIL, Assemblies, CTS, .NET languages </a:t>
-            </a:r>
-          </a:p>
-          <a:p>
-            <a:pPr marL="361950" lvl="0" indent="-361950">
-              <a:lnSpc>
-                <a:spcPct val="95000"/>
-              </a:lnSpc>
-              <a:buFont typeface="+mj-lt"/>
-              <a:buAutoNum type="arabicPeriod"/>
-              <a:tabLst/>
-            </a:pPr>
-            <a:r>
-              <a:rPr lang="en-US" sz="3000" dirty="0" smtClean="0"/>
-              <a:t>C# Language Overview – Part I</a:t>
-            </a:r>
-          </a:p>
-          <a:p>
-            <a:pPr marL="520700" lvl="1" indent="-228600">
-              <a:lnSpc>
-                <a:spcPct val="95000"/>
-              </a:lnSpc>
-            </a:pPr>
-            <a:r>
-              <a:rPr lang="en-US" sz="2800" dirty="0" smtClean="0"/>
-              <a:t>Data Types, Operators, Expressions, Statements, Console I/O, if / switch / case, Loops, Arrays, Methods</a:t>
-            </a:r>
-          </a:p>
-          <a:p>
-            <a:pPr marL="361950" lvl="0" indent="-361950">
-              <a:lnSpc>
-                <a:spcPct val="95000"/>
-              </a:lnSpc>
-              <a:buFont typeface="+mj-lt"/>
-              <a:buAutoNum type="arabicPeriod"/>
-              <a:tabLst/>
-            </a:pPr>
-            <a:r>
-              <a:rPr lang="en-US" sz="3000" dirty="0" smtClean="0"/>
-              <a:t>C# Language Overview – Part II</a:t>
-            </a:r>
-          </a:p>
-          <a:p>
-            <a:pPr marL="520700" lvl="1" indent="-228600">
-              <a:lnSpc>
-                <a:spcPct val="95000"/>
-              </a:lnSpc>
-            </a:pPr>
-            <a:r>
-              <a:rPr lang="en-US" sz="2800" dirty="0" smtClean="0"/>
-              <a:t>Creating and Using Objects, Exceptions, Strings, Generics, Collections, Attributes</a:t>
-            </a:r>
-          </a:p>
-          <a:p>
-            <a:pPr marL="361950" lvl="0" indent="-361950">
-              <a:lnSpc>
-                <a:spcPct val="95000"/>
-              </a:lnSpc>
-              <a:buFont typeface="+mj-lt"/>
-              <a:buAutoNum type="arabicPeriod"/>
-              <a:tabLst/>
-            </a:pPr>
-            <a:r>
-              <a:rPr lang="en-US" sz="3000" dirty="0" smtClean="0"/>
-              <a:t>Object-Oriented Programming with C#</a:t>
-            </a:r>
-          </a:p>
-          <a:p>
-            <a:pPr marL="520700" lvl="1" indent="-228600">
-              <a:lnSpc>
-                <a:spcPct val="95000"/>
-              </a:lnSpc>
-            </a:pPr>
-            <a:r>
-              <a:rPr lang="en-US" sz="2800" dirty="0" smtClean="0"/>
-              <a:t>Defining Classes, Constructors, Properties, Methods, Events, Interfaces, Inheritance, Polymorphism</a:t>
-            </a:r>
-          </a:p>
-        </p:txBody>
-      </p:sp>
-      <p:sp>
-        <p:nvSpPr>
-          <p:cNvPr id="4" name="Slide Number Placeholder 3"/>
-          <p:cNvSpPr>
-            <a:spLocks noGrp="1"/>
-          </p:cNvSpPr>
-          <p:nvPr>
-            <p:ph type="sldNum" sz="quarter" idx="10"/>
-          </p:nvPr>
-        </p:nvSpPr>
-        <p:spPr/>
-        <p:txBody>
-          <a:bodyPr/>
-          <a:lstStyle/>
-          <a:p>
-            <a:pPr>
-              <a:defRPr/>
-            </a:pPr>
-            <a:fld id="{58452FF4-89E3-4D1B-9927-2DBDC00E58D7}" type="slidenum">
-              <a:rPr lang="en-US" smtClean="0"/>
-              <a:pPr>
-                <a:defRPr/>
-              </a:pPr>
-              <a:t>12</a:t>
-            </a:fld>
-            <a:endParaRPr lang="en-US" dirty="0"/>
-          </a:p>
-        </p:txBody>
-      </p:sp>
-    </p:spTree>
-  </p:cSld>
-  <p:clrMapOvr>
-    <a:masterClrMapping/>
-  </p:clrMapOvr>
-  <p:timing>
-    <p:tnLst>
-      <p:par>
-        <p:cTn id="1" dur="indefinite" restart="never" nodeType="tmRoot"/>
-      </p:par>
-    </p:tnLst>
-  </p:timing>
-</p:sld>
-</file>
-
 <file path=ppt/slides/slide13.xml><?xml version="1.0" encoding="utf-8"?>
 <p:sld xmlns:a="http://schemas.openxmlformats.org/drawingml/2006/main" xmlns:r="http://schemas.openxmlformats.org/officeDocument/2006/relationships" xmlns:p="http://schemas.openxmlformats.org/presentationml/2006/main">
   <p:cSld>
@@ -6474,7 +6720,7 @@
           <a:p>
             <a:r>
               <a:rPr lang="en-US" dirty="0" smtClean="0"/>
-              <a:t>Curriculum (2)</a:t>
+              <a:t>Curriculum</a:t>
             </a:r>
             <a:endParaRPr lang="en-US" dirty="0"/>
           </a:p>
@@ -6492,61 +6738,36 @@
         </p:nvSpPr>
         <p:spPr>
           <a:xfrm>
-            <a:off x="228600" y="990600"/>
-            <a:ext cx="8686800" cy="5715000"/>
+            <a:off x="97808" y="914400"/>
+            <a:ext cx="8915400" cy="5791200"/>
           </a:xfrm>
         </p:spPr>
         <p:txBody>
           <a:bodyPr/>
           <a:lstStyle/>
           <a:p>
-            <a:pPr marL="360363" lvl="0" indent="-360363">
-              <a:lnSpc>
-                <a:spcPct val="95000"/>
-              </a:lnSpc>
-              <a:buFont typeface="+mj-lt"/>
-              <a:buAutoNum type="arabicPeriod" startAt="5"/>
-              <a:tabLst/>
-            </a:pPr>
-            <a:r>
-              <a:rPr lang="en-US" sz="3000" dirty="0" smtClean="0"/>
-              <a:t>Databases, SQL and MS SQL Server</a:t>
-            </a:r>
-          </a:p>
-          <a:p>
-            <a:pPr marL="457200" lvl="1" indent="-228600">
-              <a:lnSpc>
-                <a:spcPct val="95000"/>
-              </a:lnSpc>
-            </a:pPr>
-            <a:r>
-              <a:rPr lang="en-US" sz="2800" dirty="0" smtClean="0"/>
-              <a:t>RDBMS, SQL Language, SQL SELECT, Joins, Grouping, SQL INSERT, SQL UPDATE, SQL DELETE, MS SQL Server, SQL Server Management Studio </a:t>
-            </a:r>
-          </a:p>
-          <a:p>
             <a:pPr marL="361950" lvl="0" indent="-361950">
               <a:lnSpc>
                 <a:spcPct val="95000"/>
               </a:lnSpc>
               <a:buFont typeface="+mj-lt"/>
-              <a:buAutoNum type="arabicPeriod" startAt="5"/>
+              <a:buAutoNum type="arabicPeriod"/>
               <a:tabLst/>
             </a:pPr>
             <a:r>
               <a:rPr lang="en-US" sz="3000" dirty="0" smtClean="0"/>
-              <a:t>LINQ and ADO.NET Entity Framework</a:t>
-            </a:r>
-          </a:p>
-          <a:p>
-            <a:pPr marL="457200" lvl="1" indent="-228600">
+              <a:t>.NET Framework Overview</a:t>
+            </a:r>
+          </a:p>
+          <a:p>
+            <a:pPr marL="520700" lvl="1" indent="-228600">
               <a:lnSpc>
                 <a:spcPct val="95000"/>
               </a:lnSpc>
             </a:pPr>
             <a:r>
               <a:rPr lang="en-US" sz="2800" dirty="0" smtClean="0"/>
-              <a:t>LINQ Operators and Expressions, Projections, Conversions, Aggregations, ADO.NET Entity Framework: Read / Create / Update / Delete Data</a:t>
+              <a:t>.NET, CLR, MSIL, Assemblies, CTS, .NET languages </a:t>
             </a:r>
           </a:p>
           <a:p>
@@ -6555,23 +6776,73 @@
                 <a:spcPct val="95000"/>
               </a:lnSpc>
               <a:buFont typeface="+mj-lt"/>
-              <a:buAutoNum type="arabicPeriod" startAt="5"/>
+              <a:buAutoNum type="arabicPeriod"/>
               <a:tabLst/>
             </a:pPr>
             <a:r>
               <a:rPr lang="en-US" sz="3000" dirty="0" smtClean="0"/>
-              <a:t>Web Technologies Basics and HTML</a:t>
-            </a:r>
-          </a:p>
-          <a:p>
-            <a:pPr marL="457200" lvl="1" indent="-228600">
+              <a:t>C# Language Overview – Part I</a:t>
+            </a:r>
+          </a:p>
+          <a:p>
+            <a:pPr marL="520700" lvl="1" indent="-228600">
               <a:lnSpc>
                 <a:spcPct val="95000"/>
               </a:lnSpc>
             </a:pPr>
             <a:r>
               <a:rPr lang="en-US" sz="2800" dirty="0" smtClean="0"/>
-              <a:t>WWW, HTTP, Request-Response, HTML Fundamentals, Tags, Tables, Forms, etc.</a:t>
+              <a:t>Data Types, Operators, Expressions, Statements, Console I/O, if / switch / case, Loops, Arrays, Methods</a:t>
+            </a:r>
+          </a:p>
+          <a:p>
+            <a:pPr marL="361950" lvl="0" indent="-361950">
+              <a:lnSpc>
+                <a:spcPct val="95000"/>
+              </a:lnSpc>
+              <a:buFont typeface="+mj-lt"/>
+              <a:buAutoNum type="arabicPeriod"/>
+              <a:tabLst/>
+            </a:pPr>
+            <a:r>
+              <a:rPr lang="en-US" sz="3000" dirty="0" smtClean="0"/>
+              <a:t>C# Language Overview – Part II</a:t>
+            </a:r>
+          </a:p>
+          <a:p>
+            <a:pPr marL="520700" lvl="1" indent="-228600">
+              <a:lnSpc>
+                <a:spcPct val="95000"/>
+              </a:lnSpc>
+            </a:pPr>
+            <a:r>
+              <a:rPr lang="en-US" sz="2800" dirty="0" smtClean="0"/>
+              <a:t>Creating and Using Objects, Exceptions, Strings, Generics, Collections, Attributes</a:t>
+            </a:r>
+          </a:p>
+          <a:p>
+            <a:pPr marL="361950" lvl="0" indent="-361950">
+              <a:lnSpc>
+                <a:spcPct val="95000"/>
+              </a:lnSpc>
+              <a:buFont typeface="+mj-lt"/>
+              <a:buAutoNum type="arabicPeriod"/>
+              <a:tabLst/>
+            </a:pPr>
+            <a:r>
+              <a:rPr lang="en-US" sz="3000" dirty="0" smtClean="0"/>
+              <a:t>Object-Oriented Programming with C#</a:t>
+            </a:r>
+          </a:p>
+          <a:p>
+            <a:pPr marL="520700" lvl="1" indent="-228600">
+              <a:lnSpc>
+                <a:spcPct val="95000"/>
+              </a:lnSpc>
+            </a:pPr>
+            <a:r>
+              <a:rPr lang="en-US" sz="2800" dirty="0" smtClean="0"/>
+              <a:t>Defining Classes, Constructors, Properties, Methods, Events, Interfaces, Inheritance, Polymorphism</a:t>
             </a:r>
           </a:p>
         </p:txBody>
@@ -6654,7 +6925,7 @@
           <a:p>
             <a:r>
               <a:rPr lang="en-US" dirty="0" smtClean="0"/>
-              <a:t>Curriculum (3)</a:t>
+              <a:t>Curriculum (2)</a:t>
             </a:r>
             <a:endParaRPr lang="en-US" dirty="0"/>
           </a:p>
@@ -6672,7 +6943,7 @@
         </p:nvSpPr>
         <p:spPr>
           <a:xfrm>
-            <a:off x="228600" y="838200"/>
+            <a:off x="228600" y="990600"/>
             <a:ext cx="8686800" cy="5715000"/>
           </a:xfrm>
         </p:spPr>
@@ -6680,19 +6951,18 @@
           <a:bodyPr/>
           <a:lstStyle/>
           <a:p>
-            <a:pPr marL="355600" indent="-355600">
+            <a:pPr marL="360363" lvl="0" indent="-360363">
               <a:lnSpc>
                 <a:spcPct val="95000"/>
               </a:lnSpc>
               <a:buFont typeface="+mj-lt"/>
-              <a:buAutoNum type="arabicPeriod" startAt="8"/>
+              <a:buAutoNum type="arabicPeriod" startAt="5"/>
               <a:tabLst/>
             </a:pPr>
             <a:r>
               <a:rPr lang="en-US" sz="3000" dirty="0" smtClean="0"/>
-              <a:t>CSS and CSS3</a:t>
-            </a:r>
-            <a:endParaRPr lang="en-US" sz="3000" dirty="0"/>
+              <a:t>Databases, SQL and MS SQL Server</a:t>
+            </a:r>
           </a:p>
           <a:p>
             <a:pPr marL="457200" lvl="1" indent="-228600">
@@ -6701,36 +6971,23 @@
               </a:lnSpc>
             </a:pPr>
             <a:r>
-              <a:rPr lang="en-US" sz="2800" dirty="0" smtClean="0">
-                <a:solidFill>
-                  <a:srgbClr val="FAF7C8"/>
-                </a:solidFill>
-              </a:rPr>
-              <a:t>Selectors and style definitions, Fonts, Backgrounds, Borders, The Box Model, </a:t>
-            </a:r>
-            <a:r>
-              <a:rPr lang="en-US" sz="2800" dirty="0"/>
-              <a:t>Alignment, Margin, Padding, Visibility, Display, </a:t>
-            </a:r>
-            <a:r>
               <a:rPr lang="en-US" sz="2800" dirty="0" smtClean="0"/>
-              <a:t>Overflow, etc.</a:t>
-            </a:r>
-          </a:p>
-          <a:p>
-            <a:pPr marL="355600" indent="-355600">
+              <a:t>RDBMS, SQL Language, SQL SELECT, Joins, Grouping, SQL INSERT, SQL UPDATE, SQL DELETE, MS SQL Server, SQL Server Management Studio </a:t>
+            </a:r>
+          </a:p>
+          <a:p>
+            <a:pPr marL="361950" lvl="0" indent="-361950">
               <a:lnSpc>
                 <a:spcPct val="95000"/>
               </a:lnSpc>
               <a:buFont typeface="+mj-lt"/>
-              <a:buAutoNum type="arabicPeriod" startAt="8"/>
+              <a:buAutoNum type="arabicPeriod" startAt="5"/>
               <a:tabLst/>
             </a:pPr>
             <a:r>
               <a:rPr lang="en-US" sz="3000" dirty="0" smtClean="0"/>
-              <a:t>JavaScript</a:t>
-            </a:r>
-            <a:endParaRPr lang="en-US" sz="3000" dirty="0"/>
+              <a:t>LINQ and ADO.NET Entity Framework</a:t>
+            </a:r>
           </a:p>
           <a:p>
             <a:pPr marL="457200" lvl="1" indent="-228600">
@@ -6739,51 +6996,23 @@
               </a:lnSpc>
             </a:pPr>
             <a:r>
-              <a:rPr lang="en-US" sz="2800" dirty="0" smtClean="0">
-                <a:cs typeface="Times New Roman" pitchFamily="18" charset="0"/>
-              </a:rPr>
-              <a:t>Operators, </a:t>
-            </a:r>
-            <a:r>
-              <a:rPr lang="en-US" sz="2800" dirty="0">
-                <a:cs typeface="Times New Roman" pitchFamily="18" charset="0"/>
-              </a:rPr>
-              <a:t>Data </a:t>
-            </a:r>
-            <a:r>
-              <a:rPr lang="en-US" sz="2800" dirty="0" smtClean="0">
-                <a:cs typeface="Times New Roman" pitchFamily="18" charset="0"/>
-              </a:rPr>
-              <a:t>Types, </a:t>
-            </a:r>
-            <a:r>
               <a:rPr lang="en-US" sz="2800" dirty="0" smtClean="0"/>
-              <a:t>Statements, Loops, etc.</a:t>
-            </a:r>
-            <a:endParaRPr lang="en-US" sz="2800" noProof="1"/>
-          </a:p>
-          <a:p>
-            <a:pPr marL="514350" indent="-514350">
+              <a:t>LINQ Operators and Expressions, Projections, Conversions, Aggregations, ADO.NET Entity Framework: Read / Create / Update / Delete Data</a:t>
+            </a:r>
+          </a:p>
+          <a:p>
+            <a:pPr marL="361950" lvl="0" indent="-361950">
               <a:lnSpc>
                 <a:spcPct val="95000"/>
               </a:lnSpc>
               <a:buFont typeface="+mj-lt"/>
-              <a:buAutoNum type="arabicPeriod" startAt="8"/>
+              <a:buAutoNum type="arabicPeriod" startAt="5"/>
               <a:tabLst/>
             </a:pPr>
             <a:r>
-              <a:rPr lang="en-US" sz="3000" dirty="0" err="1" smtClean="0"/>
-              <a:t>jQuery</a:t>
-            </a:r>
-            <a:r>
-              <a:rPr lang="en-US" sz="3000" dirty="0"/>
-              <a:t> </a:t>
-            </a:r>
-            <a:r>
               <a:rPr lang="en-US" sz="3000" dirty="0" smtClean="0"/>
-              <a:t>and HTML5</a:t>
-            </a:r>
-            <a:endParaRPr lang="en-US" sz="3000" dirty="0"/>
+              <a:t>Web Technologies Basics and HTML</a:t>
+            </a:r>
           </a:p>
           <a:p>
             <a:pPr marL="457200" lvl="1" indent="-228600">
@@ -6792,61 +7021,9 @@
               </a:lnSpc>
             </a:pPr>
             <a:r>
-              <a:rPr lang="en-US" sz="2800" dirty="0"/>
-              <a:t>jQuery </a:t>
-            </a:r>
-            <a:r>
               <a:rPr lang="en-US" sz="2800" dirty="0" smtClean="0"/>
-              <a:t>Fundamentals, AJAX, </a:t>
-            </a:r>
-            <a:r>
-              <a:rPr lang="en-US" sz="2800" dirty="0"/>
-              <a:t>jQuery </a:t>
-            </a:r>
-            <a:r>
-              <a:rPr lang="en-US" sz="2800" dirty="0" smtClean="0"/>
-              <a:t>UI, HTML5</a:t>
-            </a:r>
-            <a:endParaRPr lang="en-US" sz="2800" dirty="0"/>
-          </a:p>
-          <a:p>
-            <a:pPr marL="514350" indent="-514350">
-              <a:lnSpc>
-                <a:spcPct val="95000"/>
-              </a:lnSpc>
-              <a:buFont typeface="+mj-lt"/>
-              <a:buAutoNum type="arabicPeriod" startAt="8"/>
-              <a:tabLst/>
-            </a:pPr>
-            <a:r>
-              <a:rPr lang="en-US" sz="3000" dirty="0" smtClean="0"/>
-              <a:t>ASP.NET MVC part 1</a:t>
-            </a:r>
-            <a:endParaRPr lang="en-US" sz="3000" dirty="0"/>
-          </a:p>
-          <a:p>
-            <a:pPr marL="457200" lvl="1" indent="-228600">
-              <a:lnSpc>
-                <a:spcPct val="95000"/>
-              </a:lnSpc>
-            </a:pPr>
-            <a:r>
-              <a:rPr lang="en-US" sz="2800" dirty="0" smtClean="0"/>
-              <a:t>MVC, Simple Project, Conventions, Routes, Controllers, Models, Views, </a:t>
-            </a:r>
-            <a:r>
-              <a:rPr lang="en-US" sz="2800" dirty="0" smtClean="0"/>
-              <a:t>Helpers</a:t>
-            </a:r>
-            <a:r>
-              <a:rPr lang="en-US" sz="2800" dirty="0" smtClean="0"/>
-              <a:t>, Typed </a:t>
-            </a:r>
-            <a:r>
-              <a:rPr lang="en-US" sz="2800" dirty="0" smtClean="0"/>
-              <a:t>Views</a:t>
-            </a:r>
-            <a:endParaRPr lang="en-US" sz="2800" dirty="0"/>
+              <a:t>WWW, HTTP, Request-Response, HTML Fundamentals, Tags, Tables, Forms, etc.</a:t>
+            </a:r>
           </a:p>
         </p:txBody>
       </p:sp>
@@ -6928,6 +7105,284 @@
           <a:p>
             <a:r>
               <a:rPr lang="en-US" dirty="0" smtClean="0"/>
+              <a:t>Curriculum (3)</a:t>
+            </a:r>
+            <a:endParaRPr lang="en-US" dirty="0"/>
+          </a:p>
+        </p:txBody>
+      </p:sp>
+      <p:sp>
+        <p:nvSpPr>
+          <p:cNvPr id="3" name="Content Placeholder 2"/>
+          <p:cNvSpPr>
+            <a:spLocks noGrp="1"/>
+          </p:cNvSpPr>
+          <p:nvPr>
+            <p:ph idx="1"/>
+          </p:nvPr>
+        </p:nvSpPr>
+        <p:spPr>
+          <a:xfrm>
+            <a:off x="228600" y="838200"/>
+            <a:ext cx="8686800" cy="5715000"/>
+          </a:xfrm>
+        </p:spPr>
+        <p:txBody>
+          <a:bodyPr/>
+          <a:lstStyle/>
+          <a:p>
+            <a:pPr marL="355600" indent="-355600">
+              <a:lnSpc>
+                <a:spcPct val="95000"/>
+              </a:lnSpc>
+              <a:buFont typeface="+mj-lt"/>
+              <a:buAutoNum type="arabicPeriod" startAt="8"/>
+              <a:tabLst/>
+            </a:pPr>
+            <a:r>
+              <a:rPr lang="en-US" sz="3000" dirty="0" smtClean="0"/>
+              <a:t>CSS and CSS3</a:t>
+            </a:r>
+            <a:endParaRPr lang="en-US" sz="3000" dirty="0"/>
+          </a:p>
+          <a:p>
+            <a:pPr marL="457200" lvl="1" indent="-228600">
+              <a:lnSpc>
+                <a:spcPct val="95000"/>
+              </a:lnSpc>
+            </a:pPr>
+            <a:r>
+              <a:rPr lang="en-US" sz="2800" dirty="0" smtClean="0">
+                <a:solidFill>
+                  <a:srgbClr val="FAF7C8"/>
+                </a:solidFill>
+              </a:rPr>
+              <a:t>Selectors and style definitions, Fonts, Backgrounds, Borders, The Box Model, </a:t>
+            </a:r>
+            <a:r>
+              <a:rPr lang="en-US" sz="2800" dirty="0"/>
+              <a:t>Alignment, Margin, Padding, Visibility, Display, </a:t>
+            </a:r>
+            <a:r>
+              <a:rPr lang="en-US" sz="2800" dirty="0" smtClean="0"/>
+              <a:t>Overflow, etc.</a:t>
+            </a:r>
+          </a:p>
+          <a:p>
+            <a:pPr marL="355600" indent="-355600">
+              <a:lnSpc>
+                <a:spcPct val="95000"/>
+              </a:lnSpc>
+              <a:buFont typeface="+mj-lt"/>
+              <a:buAutoNum type="arabicPeriod" startAt="8"/>
+              <a:tabLst/>
+            </a:pPr>
+            <a:r>
+              <a:rPr lang="en-US" sz="3000" dirty="0" smtClean="0"/>
+              <a:t>JavaScript</a:t>
+            </a:r>
+            <a:endParaRPr lang="en-US" sz="3000" dirty="0"/>
+          </a:p>
+          <a:p>
+            <a:pPr marL="457200" lvl="1" indent="-228600">
+              <a:lnSpc>
+                <a:spcPct val="95000"/>
+              </a:lnSpc>
+            </a:pPr>
+            <a:r>
+              <a:rPr lang="en-US" sz="2800" dirty="0" smtClean="0">
+                <a:cs typeface="Times New Roman" pitchFamily="18" charset="0"/>
+              </a:rPr>
+              <a:t>Operators, </a:t>
+            </a:r>
+            <a:r>
+              <a:rPr lang="en-US" sz="2800" dirty="0">
+                <a:cs typeface="Times New Roman" pitchFamily="18" charset="0"/>
+              </a:rPr>
+              <a:t>Data </a:t>
+            </a:r>
+            <a:r>
+              <a:rPr lang="en-US" sz="2800" dirty="0" smtClean="0">
+                <a:cs typeface="Times New Roman" pitchFamily="18" charset="0"/>
+              </a:rPr>
+              <a:t>Types, </a:t>
+            </a:r>
+            <a:r>
+              <a:rPr lang="en-US" sz="2800" dirty="0" smtClean="0"/>
+              <a:t>Statements, Loops, etc.</a:t>
+            </a:r>
+            <a:endParaRPr lang="en-US" sz="2800" noProof="1"/>
+          </a:p>
+          <a:p>
+            <a:pPr marL="514350" indent="-514350">
+              <a:lnSpc>
+                <a:spcPct val="95000"/>
+              </a:lnSpc>
+              <a:buFont typeface="+mj-lt"/>
+              <a:buAutoNum type="arabicPeriod" startAt="8"/>
+              <a:tabLst/>
+            </a:pPr>
+            <a:r>
+              <a:rPr lang="en-US" sz="3000" dirty="0" err="1" smtClean="0"/>
+              <a:t>jQuery</a:t>
+            </a:r>
+            <a:r>
+              <a:rPr lang="en-US" sz="3000" dirty="0"/>
+              <a:t> </a:t>
+            </a:r>
+            <a:r>
+              <a:rPr lang="en-US" sz="3000" dirty="0" smtClean="0"/>
+              <a:t>and HTML5</a:t>
+            </a:r>
+            <a:endParaRPr lang="en-US" sz="3000" dirty="0"/>
+          </a:p>
+          <a:p>
+            <a:pPr marL="457200" lvl="1" indent="-228600">
+              <a:lnSpc>
+                <a:spcPct val="95000"/>
+              </a:lnSpc>
+            </a:pPr>
+            <a:r>
+              <a:rPr lang="en-US" sz="2800" dirty="0"/>
+              <a:t>jQuery </a:t>
+            </a:r>
+            <a:r>
+              <a:rPr lang="en-US" sz="2800" dirty="0" smtClean="0"/>
+              <a:t>Fundamentals, AJAX, </a:t>
+            </a:r>
+            <a:r>
+              <a:rPr lang="en-US" sz="2800" dirty="0"/>
+              <a:t>jQuery </a:t>
+            </a:r>
+            <a:r>
+              <a:rPr lang="en-US" sz="2800" dirty="0" smtClean="0"/>
+              <a:t>UI, HTML5</a:t>
+            </a:r>
+            <a:endParaRPr lang="en-US" sz="2800" dirty="0"/>
+          </a:p>
+          <a:p>
+            <a:pPr marL="514350" indent="-514350">
+              <a:lnSpc>
+                <a:spcPct val="95000"/>
+              </a:lnSpc>
+              <a:buFont typeface="+mj-lt"/>
+              <a:buAutoNum type="arabicPeriod" startAt="8"/>
+              <a:tabLst/>
+            </a:pPr>
+            <a:r>
+              <a:rPr lang="en-US" sz="3000" dirty="0" smtClean="0"/>
+              <a:t>ASP.NET MVC part 1</a:t>
+            </a:r>
+            <a:endParaRPr lang="en-US" sz="3000" dirty="0"/>
+          </a:p>
+          <a:p>
+            <a:pPr marL="457200" lvl="1" indent="-228600">
+              <a:lnSpc>
+                <a:spcPct val="95000"/>
+              </a:lnSpc>
+            </a:pPr>
+            <a:r>
+              <a:rPr lang="en-US" sz="2800" dirty="0" smtClean="0"/>
+              <a:t>MVC, Simple Project, Conventions, Routes</a:t>
+            </a:r>
+            <a:r>
+              <a:rPr lang="en-US" sz="2800" dirty="0" smtClean="0"/>
+              <a:t>, Models, </a:t>
+            </a:r>
+            <a:r>
+              <a:rPr lang="en-US" sz="2800" dirty="0" smtClean="0"/>
+              <a:t>Controllers, </a:t>
+            </a:r>
+            <a:r>
+              <a:rPr lang="en-US" sz="2800" dirty="0" smtClean="0"/>
+              <a:t>Views, Razor, </a:t>
+            </a:r>
+            <a:r>
+              <a:rPr lang="en-US" sz="2800" dirty="0" smtClean="0"/>
+              <a:t>Helpers, Typed Views</a:t>
+            </a:r>
+            <a:endParaRPr lang="en-US" sz="2800" dirty="0"/>
+          </a:p>
+        </p:txBody>
+      </p:sp>
+      <p:sp>
+        <p:nvSpPr>
+          <p:cNvPr id="4" name="Slide Number Placeholder 3"/>
+          <p:cNvSpPr>
+            <a:spLocks noGrp="1"/>
+          </p:cNvSpPr>
+          <p:nvPr>
+            <p:ph type="sldNum" sz="quarter" idx="10"/>
+          </p:nvPr>
+        </p:nvSpPr>
+        <p:spPr/>
+        <p:txBody>
+          <a:bodyPr/>
+          <a:lstStyle/>
+          <a:p>
+            <a:pPr>
+              <a:defRPr/>
+            </a:pPr>
+            <a:fld id="{58452FF4-89E3-4D1B-9927-2DBDC00E58D7}" type="slidenum">
+              <a:rPr lang="en-US" smtClean="0"/>
+              <a:pPr>
+                <a:defRPr/>
+              </a:pPr>
+              <a:t>15</a:t>
+            </a:fld>
+            <a:endParaRPr lang="en-US" dirty="0"/>
+          </a:p>
+        </p:txBody>
+      </p:sp>
+    </p:spTree>
+  </p:cSld>
+  <p:clrMapOvr>
+    <a:masterClrMapping/>
+  </p:clrMapOvr>
+  <p:timing>
+    <p:tnLst>
+      <p:par>
+        <p:cTn id="1" dur="indefinite" restart="never" nodeType="tmRoot"/>
+      </p:par>
+    </p:tnLst>
+  </p:timing>
+</p:sld>
+</file>
+
+<file path=ppt/slides/slide16.xml><?xml version="1.0" encoding="utf-8"?>
+<p:sld xmlns:a="http://schemas.openxmlformats.org/drawingml/2006/main" xmlns:r="http://schemas.openxmlformats.org/officeDocument/2006/relationships" xmlns:p="http://schemas.openxmlformats.org/presentationml/2006/main">
+  <p:cSld>
+    <p:spTree>
+      <p:nvGrpSpPr>
+        <p:cNvPr id="1" name=""/>
+        <p:cNvGrpSpPr/>
+        <p:nvPr/>
+      </p:nvGrpSpPr>
+      <p:grpSpPr>
+        <a:xfrm>
+          <a:off x="0" y="0"/>
+          <a:ext cx="0" cy="0"/>
+          <a:chOff x="0" y="0"/>
+          <a:chExt cx="0" cy="0"/>
+        </a:xfrm>
+      </p:grpSpPr>
+      <p:sp>
+        <p:nvSpPr>
+          <p:cNvPr id="2" name="Title 1"/>
+          <p:cNvSpPr>
+            <a:spLocks noGrp="1"/>
+          </p:cNvSpPr>
+          <p:nvPr>
+            <p:ph type="title"/>
+          </p:nvPr>
+        </p:nvSpPr>
+        <p:spPr/>
+        <p:txBody>
+          <a:bodyPr/>
+          <a:lstStyle/>
+          <a:p>
+            <a:r>
+              <a:rPr lang="en-US" dirty="0" smtClean="0"/>
               <a:t>Curriculum (4)</a:t>
             </a:r>
             <a:endParaRPr lang="en-US" dirty="0"/>
@@ -7101,7 +7556,7 @@
               <a:pPr>
                 <a:defRPr/>
               </a:pPr>
-              <a:t>15</a:t>
+              <a:t>16</a:t>
             </a:fld>
             <a:endParaRPr lang="en-US" dirty="0"/>
           </a:p>
@@ -7122,7 +7577,7 @@
 </p:sld>
 </file>
 
-<file path=ppt/slides/slide16.xml><?xml version="1.0" encoding="utf-8"?>
+<file path=ppt/slides/slide17.xml><?xml version="1.0" encoding="utf-8"?>
 <p:sld xmlns:a="http://schemas.openxmlformats.org/drawingml/2006/main" xmlns:r="http://schemas.openxmlformats.org/officeDocument/2006/relationships" xmlns:p="http://schemas.openxmlformats.org/presentationml/2006/main">
   <p:cSld>
     <p:spTree>
@@ -7226,7 +7681,7 @@
 </p:sld>
 </file>
 
-<file path=ppt/slides/slide17.xml><?xml version="1.0" encoding="utf-8"?>
+<file path=ppt/slides/slide18.xml><?xml version="1.0" encoding="utf-8"?>
 <p:sld xmlns:a="http://schemas.openxmlformats.org/drawingml/2006/main" xmlns:r="http://schemas.openxmlformats.org/officeDocument/2006/relationships" xmlns:p="http://schemas.openxmlformats.org/presentationml/2006/main">
   <p:cSld>
     <p:spTree>
@@ -7482,7 +7937,7 @@
               <a:pPr>
                 <a:defRPr/>
               </a:pPr>
-              <a:t>17</a:t>
+              <a:t>18</a:t>
             </a:fld>
             <a:endParaRPr lang="en-US" dirty="0"/>
           </a:p>
@@ -7541,7 +7996,7 @@
 </p:sld>
 </file>
 
-<file path=ppt/slides/slide18.xml><?xml version="1.0" encoding="utf-8"?>
+<file path=ppt/slides/slide19.xml><?xml version="1.0" encoding="utf-8"?>
 <p:sld xmlns:a="http://schemas.openxmlformats.org/drawingml/2006/main" xmlns:r="http://schemas.openxmlformats.org/officeDocument/2006/relationships" xmlns:p="http://schemas.openxmlformats.org/presentationml/2006/main">
   <p:cSld>
     <p:spTree>
@@ -7608,16 +8063,6 @@
                 </a:solidFill>
               </a14:hiddenFill>
             </a:ext>
-            <a:ext uri="{91240B29-F687-4F45-9708-019B960494DF}">
-              <a14:hiddenLine xmlns:a14="http://schemas.microsoft.com/office/drawing/2010/main" w="9525">
-                <a:solidFill>
-                  <a:schemeClr val="tx1"/>
-                </a:solidFill>
-                <a:miter lim="800000"/>
-                <a:headEnd/>
-                <a:tailEnd/>
-              </a14:hiddenLine>
-            </a:ext>
           </a:extLst>
         </p:spPr>
       </p:pic>
@@ -7738,11 +8183,7 @@
             </a:r>
             <a:r>
               <a:rPr lang="en-US" dirty="0" smtClean="0"/>
-              <a:t> year student in </a:t>
-            </a:r>
-            <a:r>
-              <a:rPr lang="en-US" dirty="0" smtClean="0"/>
-              <a:t>FMI</a:t>
+              <a:t> year student in FMI</a:t>
             </a:r>
           </a:p>
           <a:p>
@@ -7852,7 +8293,7 @@
               <a:pPr>
                 <a:defRPr/>
               </a:pPr>
-              <a:t>18</a:t>
+              <a:t>19</a:t>
             </a:fld>
             <a:endParaRPr lang="en-US" dirty="0"/>
           </a:p>
@@ -7862,349 +8303,6 @@
     <p:extLst>
       <p:ext uri="{BB962C8B-B14F-4D97-AF65-F5344CB8AC3E}">
         <p14:creationId xmlns:p14="http://schemas.microsoft.com/office/powerpoint/2010/main" val="2132941897"/>
-      </p:ext>
-    </p:extLst>
-  </p:cSld>
-  <p:clrMapOvr>
-    <a:masterClrMapping/>
-  </p:clrMapOvr>
-  <p:timing>
-    <p:tnLst>
-      <p:par>
-        <p:cTn id="1" dur="indefinite" restart="never" nodeType="tmRoot"/>
-      </p:par>
-    </p:tnLst>
-  </p:timing>
-</p:sld>
-</file>
-
-<file path=ppt/slides/slide19.xml><?xml version="1.0" encoding="utf-8"?>
-<p:sld xmlns:a="http://schemas.openxmlformats.org/drawingml/2006/main" xmlns:r="http://schemas.openxmlformats.org/officeDocument/2006/relationships" xmlns:p="http://schemas.openxmlformats.org/presentationml/2006/main">
-  <p:cSld>
-    <p:spTree>
-      <p:nvGrpSpPr>
-        <p:cNvPr id="1" name=""/>
-        <p:cNvGrpSpPr/>
-        <p:nvPr/>
-      </p:nvGrpSpPr>
-      <p:grpSpPr>
-        <a:xfrm>
-          <a:off x="0" y="0"/>
-          <a:ext cx="0" cy="0"/>
-          <a:chOff x="0" y="0"/>
-          <a:chExt cx="0" cy="0"/>
-        </a:xfrm>
-      </p:grpSpPr>
-      <p:pic>
-        <p:nvPicPr>
-          <p:cNvPr id="1027" name="Picture 3"/>
-          <p:cNvPicPr>
-            <a:picLocks noChangeAspect="1" noChangeArrowheads="1"/>
-          </p:cNvPicPr>
-          <p:nvPr/>
-        </p:nvPicPr>
-        <p:blipFill>
-          <a:blip r:embed="rId2">
-            <a:extLst>
-              <a:ext uri="{28A0092B-C50C-407E-A947-70E740481C1C}">
-                <a14:useLocalDpi xmlns:a14="http://schemas.microsoft.com/office/drawing/2010/main" val="0"/>
-              </a:ext>
-            </a:extLst>
-          </a:blip>
-          <a:srcRect/>
-          <a:stretch>
-            <a:fillRect/>
-          </a:stretch>
-        </p:blipFill>
-        <p:spPr bwMode="auto">
-          <a:xfrm>
-            <a:off x="6477000" y="1208188"/>
-            <a:ext cx="1997985" cy="2449412"/>
-          </a:xfrm>
-          <a:prstGeom prst="roundRect">
-            <a:avLst>
-              <a:gd name="adj" fmla="val 1794"/>
-            </a:avLst>
-          </a:prstGeom>
-          <a:noFill/>
-          <a:ln w="3175">
-            <a:solidFill>
-              <a:schemeClr val="accent5">
-                <a:lumMod val="75000"/>
-              </a:schemeClr>
-            </a:solidFill>
-            <a:miter lim="800000"/>
-            <a:headEnd/>
-            <a:tailEnd/>
-          </a:ln>
-          <a:extLst>
-            <a:ext uri="{909E8E84-426E-40DD-AFC4-6F175D3DCCD1}">
-              <a14:hiddenFill xmlns:a14="http://schemas.microsoft.com/office/drawing/2010/main">
-                <a:solidFill>
-                  <a:schemeClr val="accent1"/>
-                </a:solidFill>
-              </a14:hiddenFill>
-            </a:ext>
-            <a:ext uri="{91240B29-F687-4F45-9708-019B960494DF}">
-              <a14:hiddenLine xmlns:a14="http://schemas.microsoft.com/office/drawing/2010/main" w="9525">
-                <a:solidFill>
-                  <a:schemeClr val="tx1"/>
-                </a:solidFill>
-                <a:miter lim="800000"/>
-                <a:headEnd/>
-                <a:tailEnd/>
-              </a14:hiddenLine>
-            </a:ext>
-          </a:extLst>
-        </p:spPr>
-      </p:pic>
-      <p:sp>
-        <p:nvSpPr>
-          <p:cNvPr id="4" name="Title 3"/>
-          <p:cNvSpPr>
-            <a:spLocks noGrp="1"/>
-          </p:cNvSpPr>
-          <p:nvPr>
-            <p:ph type="title"/>
-          </p:nvPr>
-        </p:nvSpPr>
-        <p:spPr/>
-        <p:txBody>
-          <a:bodyPr/>
-          <a:lstStyle/>
-          <a:p>
-            <a:r>
-              <a:rPr lang="en-US" dirty="0" smtClean="0"/>
-              <a:t>Trainers Team (3)</a:t>
-            </a:r>
-            <a:endParaRPr lang="en-US" dirty="0"/>
-          </a:p>
-        </p:txBody>
-      </p:sp>
-      <p:sp>
-        <p:nvSpPr>
-          <p:cNvPr id="5" name="Content Placeholder 4"/>
-          <p:cNvSpPr>
-            <a:spLocks noGrp="1"/>
-          </p:cNvSpPr>
-          <p:nvPr>
-            <p:ph idx="1"/>
-          </p:nvPr>
-        </p:nvSpPr>
-        <p:spPr>
-          <a:xfrm>
-            <a:off x="228600" y="1066800"/>
-            <a:ext cx="7620000" cy="5334000"/>
-          </a:xfrm>
-        </p:spPr>
-        <p:txBody>
-          <a:bodyPr/>
-          <a:lstStyle/>
-          <a:p>
-            <a:pPr>
-              <a:lnSpc>
-                <a:spcPct val="100000"/>
-              </a:lnSpc>
-              <a:spcBef>
-                <a:spcPts val="1200"/>
-              </a:spcBef>
-            </a:pPr>
-            <a:r>
-              <a:rPr lang="en-US" dirty="0" smtClean="0"/>
-              <a:t>Doncho Minkov</a:t>
-            </a:r>
-          </a:p>
-          <a:p>
-            <a:pPr lvl="1">
-              <a:lnSpc>
-                <a:spcPct val="100000"/>
-              </a:lnSpc>
-              <a:spcBef>
-                <a:spcPts val="1200"/>
-              </a:spcBef>
-            </a:pPr>
-            <a:r>
-              <a:rPr lang="en-US" dirty="0" smtClean="0"/>
-              <a:t>Technical Trainer</a:t>
-            </a:r>
-          </a:p>
-          <a:p>
-            <a:pPr lvl="2">
-              <a:lnSpc>
-                <a:spcPct val="100000"/>
-              </a:lnSpc>
-              <a:spcBef>
-                <a:spcPts val="1200"/>
-              </a:spcBef>
-            </a:pPr>
-            <a:r>
-              <a:rPr lang="en-US" dirty="0" smtClean="0"/>
-              <a:t>Telerik Corporation</a:t>
-            </a:r>
-          </a:p>
-          <a:p>
-            <a:pPr lvl="2">
-              <a:lnSpc>
-                <a:spcPct val="100000"/>
-              </a:lnSpc>
-              <a:spcBef>
-                <a:spcPts val="1200"/>
-              </a:spcBef>
-            </a:pPr>
-            <a:r>
-              <a:rPr lang="en-US" dirty="0" smtClean="0"/>
-              <a:t>Telerik Academy</a:t>
-            </a:r>
-          </a:p>
-          <a:p>
-            <a:pPr lvl="1">
-              <a:lnSpc>
-                <a:spcPct val="100000"/>
-              </a:lnSpc>
-              <a:spcBef>
-                <a:spcPts val="1200"/>
-              </a:spcBef>
-            </a:pPr>
-            <a:r>
-              <a:rPr lang="en-US" dirty="0" smtClean="0"/>
-              <a:t>4</a:t>
-            </a:r>
-            <a:r>
-              <a:rPr lang="en-US" baseline="30000" dirty="0" smtClean="0"/>
-              <a:t>th</a:t>
-            </a:r>
-            <a:r>
-              <a:rPr lang="en-US" dirty="0" smtClean="0"/>
-              <a:t> year student in </a:t>
-            </a:r>
-            <a:r>
-              <a:rPr lang="en-US" dirty="0" smtClean="0"/>
-              <a:t>FMI</a:t>
-            </a:r>
-          </a:p>
-          <a:p>
-            <a:pPr lvl="1">
-              <a:lnSpc>
-                <a:spcPct val="100000"/>
-              </a:lnSpc>
-              <a:spcBef>
-                <a:spcPts val="1200"/>
-              </a:spcBef>
-            </a:pPr>
-            <a:r>
-              <a:rPr lang="en-US" dirty="0">
-                <a:solidFill>
-                  <a:srgbClr val="CCFF66">
-                    <a:lumMod val="40000"/>
-                    <a:lumOff val="60000"/>
-                  </a:srgbClr>
-                </a:solidFill>
-              </a:rPr>
-              <a:t>E-mail: </a:t>
-            </a:r>
-            <a:r>
-              <a:rPr lang="en-US" noProof="1">
-                <a:solidFill>
-                  <a:srgbClr val="CCFF66">
-                    <a:lumMod val="40000"/>
-                    <a:lumOff val="60000"/>
-                  </a:srgbClr>
-                </a:solidFill>
-              </a:rPr>
-              <a:t>doncho.minkov</a:t>
-            </a:r>
-            <a:r>
-              <a:rPr lang="en-US" dirty="0">
-                <a:solidFill>
-                  <a:srgbClr val="CCFF66">
-                    <a:lumMod val="40000"/>
-                    <a:lumOff val="60000"/>
-                  </a:srgbClr>
-                </a:solidFill>
-              </a:rPr>
-              <a:t> [at] telerik.com</a:t>
-            </a:r>
-          </a:p>
-          <a:p>
-            <a:pPr lvl="1">
-              <a:lnSpc>
-                <a:spcPct val="100000"/>
-              </a:lnSpc>
-              <a:spcBef>
-                <a:spcPts val="1200"/>
-              </a:spcBef>
-            </a:pPr>
-            <a:r>
-              <a:rPr lang="en-US" dirty="0">
-                <a:solidFill>
-                  <a:srgbClr val="CCFF66">
-                    <a:lumMod val="40000"/>
-                    <a:lumOff val="60000"/>
-                  </a:srgbClr>
-                </a:solidFill>
-              </a:rPr>
-              <a:t>Web site</a:t>
-            </a:r>
-            <a:r>
-              <a:rPr lang="ru-RU" dirty="0">
-                <a:solidFill>
-                  <a:srgbClr val="CCFF66">
-                    <a:lumMod val="40000"/>
-                    <a:lumOff val="60000"/>
-                  </a:srgbClr>
-                </a:solidFill>
-              </a:rPr>
-              <a:t>: </a:t>
-            </a:r>
-            <a:r>
-              <a:rPr lang="en-US" dirty="0" smtClean="0">
-                <a:solidFill>
-                  <a:srgbClr val="CCFF66">
-                    <a:lumMod val="40000"/>
-                    <a:lumOff val="60000"/>
-                  </a:srgbClr>
-                </a:solidFill>
-                <a:hlinkClick r:id="rId3"/>
-              </a:rPr>
-              <a:t>donchominkov.blogspot.com</a:t>
-            </a:r>
-            <a:endParaRPr lang="en-US" dirty="0" smtClean="0"/>
-          </a:p>
-        </p:txBody>
-      </p:sp>
-      <p:sp>
-        <p:nvSpPr>
-          <p:cNvPr id="7" name="Slide Number Placeholder 3"/>
-          <p:cNvSpPr>
-            <a:spLocks noGrp="1"/>
-          </p:cNvSpPr>
-          <p:nvPr>
-            <p:ph type="sldNum" sz="quarter" idx="10"/>
-          </p:nvPr>
-        </p:nvSpPr>
-        <p:spPr/>
-        <p:txBody>
-          <a:bodyPr/>
-          <a:lstStyle/>
-          <a:p>
-            <a:pPr>
-              <a:defRPr/>
-            </a:pPr>
-            <a:fld id="{58452FF4-89E3-4D1B-9927-2DBDC00E58D7}" type="slidenum">
-              <a:rPr lang="en-US" smtClean="0"/>
-              <a:pPr>
-                <a:defRPr/>
-              </a:pPr>
-              <a:t>19</a:t>
-            </a:fld>
-            <a:endParaRPr lang="en-US" dirty="0"/>
-          </a:p>
-        </p:txBody>
-      </p:sp>
-    </p:spTree>
-    <p:extLst>
-      <p:ext uri="{BB962C8B-B14F-4D97-AF65-F5344CB8AC3E}">
-        <p14:creationId xmlns:p14="http://schemas.microsoft.com/office/powerpoint/2010/main" val="3732237125"/>
       </p:ext>
     </p:extLst>
   </p:cSld>
@@ -8460,6 +8558,335 @@
           <a:chExt cx="0" cy="0"/>
         </a:xfrm>
       </p:grpSpPr>
+      <p:pic>
+        <p:nvPicPr>
+          <p:cNvPr id="1027" name="Picture 3"/>
+          <p:cNvPicPr>
+            <a:picLocks noChangeAspect="1" noChangeArrowheads="1"/>
+          </p:cNvPicPr>
+          <p:nvPr/>
+        </p:nvPicPr>
+        <p:blipFill>
+          <a:blip r:embed="rId2">
+            <a:extLst>
+              <a:ext uri="{28A0092B-C50C-407E-A947-70E740481C1C}">
+                <a14:useLocalDpi xmlns:a14="http://schemas.microsoft.com/office/drawing/2010/main" val="0"/>
+              </a:ext>
+            </a:extLst>
+          </a:blip>
+          <a:srcRect/>
+          <a:stretch>
+            <a:fillRect/>
+          </a:stretch>
+        </p:blipFill>
+        <p:spPr bwMode="auto">
+          <a:xfrm>
+            <a:off x="6477000" y="1208188"/>
+            <a:ext cx="1997985" cy="2449412"/>
+          </a:xfrm>
+          <a:prstGeom prst="roundRect">
+            <a:avLst>
+              <a:gd name="adj" fmla="val 1794"/>
+            </a:avLst>
+          </a:prstGeom>
+          <a:noFill/>
+          <a:ln w="3175">
+            <a:solidFill>
+              <a:schemeClr val="accent5">
+                <a:lumMod val="75000"/>
+              </a:schemeClr>
+            </a:solidFill>
+            <a:miter lim="800000"/>
+            <a:headEnd/>
+            <a:tailEnd/>
+          </a:ln>
+          <a:extLst>
+            <a:ext uri="{909E8E84-426E-40DD-AFC4-6F175D3DCCD1}">
+              <a14:hiddenFill xmlns:a14="http://schemas.microsoft.com/office/drawing/2010/main">
+                <a:solidFill>
+                  <a:schemeClr val="accent1"/>
+                </a:solidFill>
+              </a14:hiddenFill>
+            </a:ext>
+          </a:extLst>
+        </p:spPr>
+      </p:pic>
+      <p:sp>
+        <p:nvSpPr>
+          <p:cNvPr id="4" name="Title 3"/>
+          <p:cNvSpPr>
+            <a:spLocks noGrp="1"/>
+          </p:cNvSpPr>
+          <p:nvPr>
+            <p:ph type="title"/>
+          </p:nvPr>
+        </p:nvSpPr>
+        <p:spPr/>
+        <p:txBody>
+          <a:bodyPr/>
+          <a:lstStyle/>
+          <a:p>
+            <a:r>
+              <a:rPr lang="en-US" dirty="0" smtClean="0"/>
+              <a:t>Trainers Team (3)</a:t>
+            </a:r>
+            <a:endParaRPr lang="en-US" dirty="0"/>
+          </a:p>
+        </p:txBody>
+      </p:sp>
+      <p:sp>
+        <p:nvSpPr>
+          <p:cNvPr id="5" name="Content Placeholder 4"/>
+          <p:cNvSpPr>
+            <a:spLocks noGrp="1"/>
+          </p:cNvSpPr>
+          <p:nvPr>
+            <p:ph idx="1"/>
+          </p:nvPr>
+        </p:nvSpPr>
+        <p:spPr>
+          <a:xfrm>
+            <a:off x="228600" y="1066800"/>
+            <a:ext cx="7620000" cy="5334000"/>
+          </a:xfrm>
+        </p:spPr>
+        <p:txBody>
+          <a:bodyPr/>
+          <a:lstStyle/>
+          <a:p>
+            <a:pPr>
+              <a:lnSpc>
+                <a:spcPct val="100000"/>
+              </a:lnSpc>
+              <a:spcBef>
+                <a:spcPts val="1200"/>
+              </a:spcBef>
+            </a:pPr>
+            <a:r>
+              <a:rPr lang="en-US" dirty="0" smtClean="0"/>
+              <a:t>Doncho Minkov</a:t>
+            </a:r>
+          </a:p>
+          <a:p>
+            <a:pPr lvl="1">
+              <a:lnSpc>
+                <a:spcPct val="100000"/>
+              </a:lnSpc>
+              <a:spcBef>
+                <a:spcPts val="1200"/>
+              </a:spcBef>
+            </a:pPr>
+            <a:r>
+              <a:rPr lang="en-US" dirty="0" smtClean="0"/>
+              <a:t>Technical Trainer</a:t>
+            </a:r>
+          </a:p>
+          <a:p>
+            <a:pPr lvl="2">
+              <a:lnSpc>
+                <a:spcPct val="100000"/>
+              </a:lnSpc>
+              <a:spcBef>
+                <a:spcPts val="1200"/>
+              </a:spcBef>
+            </a:pPr>
+            <a:r>
+              <a:rPr lang="en-US" dirty="0" smtClean="0"/>
+              <a:t>Telerik Corporation</a:t>
+            </a:r>
+          </a:p>
+          <a:p>
+            <a:pPr lvl="2">
+              <a:lnSpc>
+                <a:spcPct val="100000"/>
+              </a:lnSpc>
+              <a:spcBef>
+                <a:spcPts val="1200"/>
+              </a:spcBef>
+            </a:pPr>
+            <a:r>
+              <a:rPr lang="en-US" dirty="0" smtClean="0"/>
+              <a:t>Telerik Academy</a:t>
+            </a:r>
+          </a:p>
+          <a:p>
+            <a:pPr lvl="1">
+              <a:lnSpc>
+                <a:spcPct val="100000"/>
+              </a:lnSpc>
+              <a:spcBef>
+                <a:spcPts val="1200"/>
+              </a:spcBef>
+            </a:pPr>
+            <a:r>
+              <a:rPr lang="en-US" dirty="0" smtClean="0"/>
+              <a:t>4</a:t>
+            </a:r>
+            <a:r>
+              <a:rPr lang="en-US" baseline="30000" dirty="0" smtClean="0"/>
+              <a:t>th</a:t>
+            </a:r>
+            <a:r>
+              <a:rPr lang="en-US" dirty="0" smtClean="0"/>
+              <a:t> year student in FMI</a:t>
+            </a:r>
+          </a:p>
+          <a:p>
+            <a:pPr lvl="1">
+              <a:lnSpc>
+                <a:spcPct val="100000"/>
+              </a:lnSpc>
+              <a:spcBef>
+                <a:spcPts val="1200"/>
+              </a:spcBef>
+            </a:pPr>
+            <a:r>
+              <a:rPr lang="en-US" dirty="0">
+                <a:solidFill>
+                  <a:srgbClr val="CCFF66">
+                    <a:lumMod val="40000"/>
+                    <a:lumOff val="60000"/>
+                  </a:srgbClr>
+                </a:solidFill>
+              </a:rPr>
+              <a:t>E-mail: </a:t>
+            </a:r>
+            <a:r>
+              <a:rPr lang="en-US" noProof="1">
+                <a:solidFill>
+                  <a:srgbClr val="CCFF66">
+                    <a:lumMod val="40000"/>
+                    <a:lumOff val="60000"/>
+                  </a:srgbClr>
+                </a:solidFill>
+              </a:rPr>
+              <a:t>doncho.minkov</a:t>
+            </a:r>
+            <a:r>
+              <a:rPr lang="en-US" dirty="0">
+                <a:solidFill>
+                  <a:srgbClr val="CCFF66">
+                    <a:lumMod val="40000"/>
+                    <a:lumOff val="60000"/>
+                  </a:srgbClr>
+                </a:solidFill>
+              </a:rPr>
+              <a:t> [at] telerik.com</a:t>
+            </a:r>
+          </a:p>
+          <a:p>
+            <a:pPr lvl="1">
+              <a:lnSpc>
+                <a:spcPct val="100000"/>
+              </a:lnSpc>
+              <a:spcBef>
+                <a:spcPts val="1200"/>
+              </a:spcBef>
+            </a:pPr>
+            <a:r>
+              <a:rPr lang="en-US" dirty="0">
+                <a:solidFill>
+                  <a:srgbClr val="CCFF66">
+                    <a:lumMod val="40000"/>
+                    <a:lumOff val="60000"/>
+                  </a:srgbClr>
+                </a:solidFill>
+              </a:rPr>
+              <a:t>Web site</a:t>
+            </a:r>
+            <a:r>
+              <a:rPr lang="ru-RU" dirty="0">
+                <a:solidFill>
+                  <a:srgbClr val="CCFF66">
+                    <a:lumMod val="40000"/>
+                    <a:lumOff val="60000"/>
+                  </a:srgbClr>
+                </a:solidFill>
+              </a:rPr>
+              <a:t>: </a:t>
+            </a:r>
+            <a:r>
+              <a:rPr lang="en-US" dirty="0" smtClean="0">
+                <a:solidFill>
+                  <a:srgbClr val="CCFF66">
+                    <a:lumMod val="40000"/>
+                    <a:lumOff val="60000"/>
+                  </a:srgbClr>
+                </a:solidFill>
+                <a:hlinkClick r:id="rId3"/>
+              </a:rPr>
+              <a:t>donchominkov.blogspot.com</a:t>
+            </a:r>
+            <a:endParaRPr lang="en-US" dirty="0" smtClean="0"/>
+          </a:p>
+        </p:txBody>
+      </p:sp>
+      <p:sp>
+        <p:nvSpPr>
+          <p:cNvPr id="7" name="Slide Number Placeholder 3"/>
+          <p:cNvSpPr>
+            <a:spLocks noGrp="1"/>
+          </p:cNvSpPr>
+          <p:nvPr>
+            <p:ph type="sldNum" sz="quarter" idx="10"/>
+          </p:nvPr>
+        </p:nvSpPr>
+        <p:spPr/>
+        <p:txBody>
+          <a:bodyPr/>
+          <a:lstStyle/>
+          <a:p>
+            <a:pPr>
+              <a:defRPr/>
+            </a:pPr>
+            <a:fld id="{58452FF4-89E3-4D1B-9927-2DBDC00E58D7}" type="slidenum">
+              <a:rPr lang="en-US" smtClean="0"/>
+              <a:pPr>
+                <a:defRPr/>
+              </a:pPr>
+              <a:t>20</a:t>
+            </a:fld>
+            <a:endParaRPr lang="en-US" dirty="0"/>
+          </a:p>
+        </p:txBody>
+      </p:sp>
+    </p:spTree>
+    <p:extLst>
+      <p:ext uri="{BB962C8B-B14F-4D97-AF65-F5344CB8AC3E}">
+        <p14:creationId xmlns:p14="http://schemas.microsoft.com/office/powerpoint/2010/main" val="3732237125"/>
+      </p:ext>
+    </p:extLst>
+  </p:cSld>
+  <p:clrMapOvr>
+    <a:masterClrMapping/>
+  </p:clrMapOvr>
+  <p:timing>
+    <p:tnLst>
+      <p:par>
+        <p:cTn id="1" dur="indefinite" restart="never" nodeType="tmRoot"/>
+      </p:par>
+    </p:tnLst>
+  </p:timing>
+</p:sld>
+</file>
+
+<file path=ppt/slides/slide21.xml><?xml version="1.0" encoding="utf-8"?>
+<p:sld xmlns:a="http://schemas.openxmlformats.org/drawingml/2006/main" xmlns:r="http://schemas.openxmlformats.org/officeDocument/2006/relationships" xmlns:p="http://schemas.openxmlformats.org/presentationml/2006/main">
+  <p:cSld>
+    <p:spTree>
+      <p:nvGrpSpPr>
+        <p:cNvPr id="1" name=""/>
+        <p:cNvGrpSpPr/>
+        <p:nvPr/>
+      </p:nvGrpSpPr>
+      <p:grpSpPr>
+        <a:xfrm>
+          <a:off x="0" y="0"/>
+          <a:ext cx="0" cy="0"/>
+          <a:chOff x="0" y="0"/>
+          <a:chExt cx="0" cy="0"/>
+        </a:xfrm>
+      </p:grpSpPr>
       <p:sp>
         <p:nvSpPr>
           <p:cNvPr id="4" name="Title 3"/>
@@ -8559,11 +8986,7 @@
             </a:pPr>
             <a:r>
               <a:rPr lang="en-US" dirty="0" smtClean="0"/>
-              <a:t>ASP.NET </a:t>
-            </a:r>
-            <a:r>
-              <a:rPr lang="en-US" dirty="0" smtClean="0"/>
-              <a:t>Team</a:t>
+              <a:t>ASP.NET Team</a:t>
             </a:r>
           </a:p>
           <a:p>
@@ -8692,7 +9115,7 @@
               <a:pPr>
                 <a:defRPr/>
               </a:pPr>
-              <a:t>20</a:t>
+              <a:t>21</a:t>
             </a:fld>
             <a:endParaRPr lang="en-US" dirty="0"/>
           </a:p>
@@ -8769,7 +9192,7 @@
 </p:sld>
 </file>
 
-<file path=ppt/slides/slide21.xml><?xml version="1.0" encoding="utf-8"?>
+<file path=ppt/slides/slide22.xml><?xml version="1.0" encoding="utf-8"?>
 <p:sld xmlns:a="http://schemas.openxmlformats.org/drawingml/2006/main" xmlns:r="http://schemas.openxmlformats.org/officeDocument/2006/relationships" xmlns:p="http://schemas.openxmlformats.org/presentationml/2006/main">
   <p:cSld>
     <p:spTree>
@@ -8944,11 +9367,7 @@
             </a:pPr>
             <a:r>
               <a:rPr lang="en-US" dirty="0" smtClean="0"/>
-              <a:t>Centaur </a:t>
-            </a:r>
-            <a:r>
-              <a:rPr lang="en-US" dirty="0" smtClean="0"/>
-              <a:t>Team</a:t>
+              <a:t>Centaur Team</a:t>
             </a:r>
           </a:p>
           <a:p>
@@ -9013,7 +9432,7 @@
               <a:pPr>
                 <a:defRPr/>
               </a:pPr>
-              <a:t>21</a:t>
+              <a:t>22</a:t>
             </a:fld>
             <a:endParaRPr lang="en-US" dirty="0"/>
           </a:p>
@@ -9039,7 +9458,7 @@
 </p:sld>
 </file>
 
-<file path=ppt/slides/slide22.xml><?xml version="1.0" encoding="utf-8"?>
+<file path=ppt/slides/slide23.xml><?xml version="1.0" encoding="utf-8"?>
 <p:sld xmlns:a="http://schemas.openxmlformats.org/drawingml/2006/main" xmlns:r="http://schemas.openxmlformats.org/officeDocument/2006/relationships" xmlns:p="http://schemas.openxmlformats.org/presentationml/2006/main">
   <p:cSld>
     <p:spTree>
@@ -9192,11 +9611,7 @@
             </a:r>
             <a:r>
               <a:rPr lang="en-US" noProof="1"/>
-              <a:t>ventsy.popov [at</a:t>
-            </a:r>
-            <a:r>
-              <a:rPr lang="en-US" noProof="1"/>
-              <a:t>] </a:t>
+              <a:t>ventsy.popov [at] </a:t>
             </a:r>
             <a:r>
               <a:rPr lang="en-US" noProof="1" smtClean="0"/>
@@ -9229,7 +9644,7 @@
               <a:pPr>
                 <a:defRPr/>
               </a:pPr>
-              <a:t>22</a:t>
+              <a:t>23</a:t>
             </a:fld>
             <a:endParaRPr lang="en-US" dirty="0"/>
           </a:p>
@@ -9317,7 +9732,7 @@
 </p:sld>
 </file>
 
-<file path=ppt/slides/slide23.xml><?xml version="1.0" encoding="utf-8"?>
+<file path=ppt/slides/slide24.xml><?xml version="1.0" encoding="utf-8"?>
 <p:sld xmlns:a="http://schemas.openxmlformats.org/drawingml/2006/main" xmlns:r="http://schemas.openxmlformats.org/officeDocument/2006/relationships" xmlns:p="http://schemas.openxmlformats.org/presentationml/2006/main">
   <p:cSld>
     <p:spTree>
@@ -9431,11 +9846,7 @@
             </a:pPr>
             <a:r>
               <a:rPr lang="en-US" dirty="0" smtClean="0"/>
-              <a:t>Centaur </a:t>
-            </a:r>
-            <a:r>
-              <a:rPr lang="en-US" dirty="0" smtClean="0"/>
-              <a:t>Team</a:t>
+              <a:t>Centaur Team</a:t>
             </a:r>
           </a:p>
           <a:p>
@@ -9453,11 +9864,7 @@
             </a:r>
             <a:r>
               <a:rPr lang="en-US" noProof="1"/>
-              <a:t>аlexander.vakrilov [at</a:t>
-            </a:r>
-            <a:r>
-              <a:rPr lang="en-US" noProof="1"/>
-              <a:t>] </a:t>
+              <a:t>аlexander.vakrilov [at] </a:t>
             </a:r>
             <a:r>
               <a:rPr lang="en-US" noProof="1" smtClean="0"/>
@@ -9490,7 +9897,7 @@
               <a:pPr>
                 <a:defRPr/>
               </a:pPr>
-              <a:t>23</a:t>
+              <a:t>24</a:t>
             </a:fld>
             <a:endParaRPr lang="en-US" dirty="0"/>
           </a:p>
@@ -9569,7 +9976,7 @@
 </p:sld>
 </file>
 
-<file path=ppt/slides/slide24.xml><?xml version="1.0" encoding="utf-8"?>
+<file path=ppt/slides/slide25.xml><?xml version="1.0" encoding="utf-8"?>
 <p:sld xmlns:a="http://schemas.openxmlformats.org/drawingml/2006/main" xmlns:r="http://schemas.openxmlformats.org/officeDocument/2006/relationships" xmlns:p="http://schemas.openxmlformats.org/presentationml/2006/main">
   <p:cSld>
     <p:spTree>
@@ -9723,7 +10130,7 @@
 </p:sld>
 </file>
 
-<file path=ppt/slides/slide25.xml><?xml version="1.0" encoding="utf-8"?>
+<file path=ppt/slides/slide26.xml><?xml version="1.0" encoding="utf-8"?>
 <p:sld xmlns:a="http://schemas.openxmlformats.org/drawingml/2006/main" xmlns:r="http://schemas.openxmlformats.org/officeDocument/2006/relationships" xmlns:p="http://schemas.openxmlformats.org/presentationml/2006/main">
   <p:cSld>
     <p:spTree>
@@ -9838,11 +10245,7 @@
             </a:pPr>
             <a:r>
               <a:rPr lang="en-US" dirty="0" smtClean="0"/>
-              <a:t>Based on .NET Framework, ASP.NET MVC, </a:t>
-            </a:r>
-            <a:r>
-              <a:rPr lang="en-US" dirty="0" smtClean="0"/>
-              <a:t>HTML</a:t>
+              <a:t>Based on .NET Framework, ASP.NET MVC, HTML</a:t>
             </a:r>
             <a:r>
               <a:rPr lang="en-US" dirty="0" smtClean="0">
@@ -9853,11 +10256,7 @@
             </a:r>
             <a:r>
               <a:rPr lang="en-US" dirty="0" smtClean="0"/>
-              <a:t>, SQL </a:t>
-            </a:r>
-            <a:r>
-              <a:rPr lang="en-US" dirty="0" smtClean="0"/>
-              <a:t>Server and Entity Framework</a:t>
+              <a:t>, SQL Server and Entity Framework</a:t>
             </a:r>
           </a:p>
           <a:p>
@@ -9929,7 +10328,7 @@
               <a:pPr>
                 <a:defRPr/>
               </a:pPr>
-              <a:t>25</a:t>
+              <a:t>26</a:t>
             </a:fld>
             <a:endParaRPr lang="en-US" dirty="0"/>
           </a:p>
@@ -9991,7 +10390,7 @@
 </p:sld>
 </file>
 
-<file path=ppt/slides/slide26.xml><?xml version="1.0" encoding="utf-8"?>
+<file path=ppt/slides/slide27.xml><?xml version="1.0" encoding="utf-8"?>
 <p:sld xmlns:a="http://schemas.openxmlformats.org/drawingml/2006/main" xmlns:r="http://schemas.openxmlformats.org/officeDocument/2006/relationships" xmlns:p="http://schemas.openxmlformats.org/presentationml/2006/main">
   <p:cSld>
     <p:spTree>
@@ -10205,7 +10604,7 @@
               <a:pPr>
                 <a:defRPr/>
               </a:pPr>
-              <a:t>26</a:t>
+              <a:t>27</a:t>
             </a:fld>
             <a:endParaRPr lang="en-US" dirty="0"/>
           </a:p>
@@ -10263,15 +10662,7 @@
             </a:solidFill>
           </a:ln>
           <a:effectLst/>
-          <a:extLst>
-            <a:ext uri="{909E8E84-426E-40DD-AFC4-6F175D3DCCD1}">
-              <a14:hiddenFill xmlns:a14="http://schemas.microsoft.com/office/drawing/2010/main">
-                <a:solidFill>
-                  <a:srgbClr val="FFFFFF"/>
-                </a:solidFill>
-              </a14:hiddenFill>
-            </a:ext>
-          </a:extLst>
+          <a:extLst/>
         </p:spPr>
       </p:pic>
     </p:spTree>
@@ -10294,7 +10685,7 @@
 </p:sld>
 </file>
 
-<file path=ppt/slides/slide27.xml><?xml version="1.0" encoding="utf-8"?>
+<file path=ppt/slides/slide28.xml><?xml version="1.0" encoding="utf-8"?>
 <p:sld xmlns:a="http://schemas.openxmlformats.org/drawingml/2006/main" xmlns:r="http://schemas.openxmlformats.org/officeDocument/2006/relationships" xmlns:p="http://schemas.openxmlformats.org/presentationml/2006/main">
   <p:cSld>
     <p:spTree>
@@ -10364,13 +10755,8 @@
             </a:pPr>
             <a:r>
               <a:rPr lang="en-US" sz="3000" dirty="0" smtClean="0"/>
-              <a:t>Homework submission </a:t>
-            </a:r>
-            <a:r>
-              <a:rPr lang="en-US" sz="3000" dirty="0" smtClean="0"/>
-              <a:t>form:</a:t>
-            </a:r>
-            <a:endParaRPr lang="en-US" sz="3000" dirty="0" smtClean="0"/>
+              <a:t>Homework submission form:</a:t>
+            </a:r>
           </a:p>
           <a:p>
             <a:pPr lvl="1">
@@ -10495,7 +10881,7 @@
               <a:pPr>
                 <a:defRPr/>
               </a:pPr>
-              <a:t>27</a:t>
+              <a:t>28</a:t>
             </a:fld>
             <a:endParaRPr lang="en-US" dirty="0"/>
           </a:p>
@@ -11951,7 +12337,7 @@
 </p:sld>
 </file>
 
-<file path=ppt/slides/slide28.xml><?xml version="1.0" encoding="utf-8"?>
+<file path=ppt/slides/slide29.xml><?xml version="1.0" encoding="utf-8"?>
 <p:sld xmlns:a="http://schemas.openxmlformats.org/drawingml/2006/main" xmlns:r="http://schemas.openxmlformats.org/officeDocument/2006/relationships" xmlns:p="http://schemas.openxmlformats.org/presentationml/2006/main">
   <p:cSld>
     <p:spTree>
@@ -12035,7 +12421,15 @@
             </a:pPr>
             <a:r>
               <a:rPr lang="en-US" dirty="0" smtClean="0"/>
-              <a:t>10% of the students will get certificate</a:t>
+              <a:t>10% of the students will </a:t>
+            </a:r>
+            <a:r>
+              <a:rPr lang="en-US" dirty="0" smtClean="0"/>
+              <a:t>get a </a:t>
+            </a:r>
+            <a:r>
+              <a:rPr lang="en-US" dirty="0" smtClean="0"/>
+              <a:t>certificate</a:t>
             </a:r>
           </a:p>
           <a:p>
@@ -12140,7 +12534,7 @@
               <a:pPr>
                 <a:defRPr/>
               </a:pPr>
-              <a:t>28</a:t>
+              <a:t>29</a:t>
             </a:fld>
             <a:endParaRPr lang="en-US" dirty="0"/>
           </a:p>
@@ -12302,7 +12696,243 @@
 </p:sld>
 </file>
 
-<file path=ppt/slides/slide29.xml><?xml version="1.0" encoding="utf-8"?>
+<file path=ppt/slides/slide3.xml><?xml version="1.0" encoding="utf-8"?>
+<p:sld xmlns:a="http://schemas.openxmlformats.org/drawingml/2006/main" xmlns:r="http://schemas.openxmlformats.org/officeDocument/2006/relationships" xmlns:p="http://schemas.openxmlformats.org/presentationml/2006/main">
+  <p:cSld>
+    <p:spTree>
+      <p:nvGrpSpPr>
+        <p:cNvPr id="1" name=""/>
+        <p:cNvGrpSpPr/>
+        <p:nvPr/>
+      </p:nvGrpSpPr>
+      <p:grpSpPr>
+        <a:xfrm>
+          <a:off x="0" y="0"/>
+          <a:ext cx="0" cy="0"/>
+          <a:chOff x="0" y="0"/>
+          <a:chExt cx="0" cy="0"/>
+        </a:xfrm>
+      </p:grpSpPr>
+      <p:sp>
+        <p:nvSpPr>
+          <p:cNvPr id="2" name="Title 1"/>
+          <p:cNvSpPr>
+            <a:spLocks noGrp="1"/>
+          </p:cNvSpPr>
+          <p:nvPr>
+            <p:ph type="title"/>
+          </p:nvPr>
+        </p:nvSpPr>
+        <p:spPr/>
+        <p:txBody>
+          <a:bodyPr/>
+          <a:lstStyle/>
+          <a:p>
+            <a:r>
+              <a:rPr lang="en-US" dirty="0" smtClean="0"/>
+              <a:t>About Telerik</a:t>
+            </a:r>
+            <a:endParaRPr lang="en-US" dirty="0"/>
+          </a:p>
+        </p:txBody>
+      </p:sp>
+      <p:sp>
+        <p:nvSpPr>
+          <p:cNvPr id="3" name="Content Placeholder 2"/>
+          <p:cNvSpPr>
+            <a:spLocks noGrp="1"/>
+          </p:cNvSpPr>
+          <p:nvPr>
+            <p:ph idx="1"/>
+          </p:nvPr>
+        </p:nvSpPr>
+        <p:spPr>
+          <a:xfrm>
+            <a:off x="228600" y="762000"/>
+            <a:ext cx="8686800" cy="5638800"/>
+          </a:xfrm>
+        </p:spPr>
+        <p:txBody>
+          <a:bodyPr/>
+          <a:lstStyle/>
+          <a:p>
+            <a:pPr>
+              <a:tabLst/>
+            </a:pPr>
+            <a:r>
+              <a:rPr lang="en-US" dirty="0" smtClean="0"/>
+              <a:t>What </a:t>
+            </a:r>
+            <a:r>
+              <a:rPr lang="en-US" dirty="0" smtClean="0">
+                <a:solidFill>
+                  <a:schemeClr val="accent5">
+                    <a:lumMod val="20000"/>
+                    <a:lumOff val="80000"/>
+                  </a:schemeClr>
+                </a:solidFill>
+              </a:rPr>
+              <a:t>Telerik</a:t>
+            </a:r>
+            <a:r>
+              <a:rPr lang="en-US" dirty="0" smtClean="0"/>
+              <a:t> does?</a:t>
+            </a:r>
+          </a:p>
+          <a:p>
+            <a:pPr lvl="1"/>
+            <a:r>
+              <a:rPr lang="en-US" dirty="0" smtClean="0"/>
+              <a:t>Leading vendor of ASP.NET AJAX, Silverlight, </a:t>
+            </a:r>
+            <a:r>
+              <a:rPr lang="en-US" dirty="0" smtClean="0"/>
+              <a:t>WPF, Window Phone 7 </a:t>
+            </a:r>
+            <a:r>
+              <a:rPr lang="en-US" dirty="0" smtClean="0"/>
+              <a:t>and ASP.NET MVC components, ORM, Reporting, and CMS solutions and </a:t>
+            </a:r>
+            <a:r>
+              <a:rPr lang="en-US" dirty="0" smtClean="0"/>
+              <a:t>Visual Studio plugins</a:t>
+            </a:r>
+            <a:endParaRPr lang="en-US" dirty="0" smtClean="0"/>
+          </a:p>
+          <a:p>
+            <a:r>
+              <a:rPr lang="en-US" dirty="0" smtClean="0"/>
+              <a:t>Headquartered in Bulgaria</a:t>
+            </a:r>
+          </a:p>
+          <a:p>
+            <a:pPr lvl="1"/>
+            <a:r>
+              <a:rPr lang="en-US" dirty="0" smtClean="0"/>
+              <a:t>With offices in USA, Germany, Australia, India</a:t>
+            </a:r>
+          </a:p>
+          <a:p>
+            <a:pPr lvl="1"/>
+            <a:r>
+              <a:rPr lang="en-US" dirty="0" smtClean="0">
+                <a:latin typeface="Consolas" pitchFamily="49" charset="0"/>
+                <a:cs typeface="Consolas" pitchFamily="49" charset="0"/>
+              </a:rPr>
+              <a:t>450</a:t>
+            </a:r>
+            <a:r>
+              <a:rPr lang="en-US" dirty="0" smtClean="0"/>
+              <a:t> employees – mostly developers</a:t>
+            </a:r>
+          </a:p>
+          <a:p>
+            <a:r>
+              <a:rPr lang="en-US" dirty="0" smtClean="0"/>
+              <a:t>Employer #1 in Bulgaria for 2010</a:t>
+            </a:r>
+          </a:p>
+          <a:p>
+            <a:r>
+              <a:rPr lang="en-US" dirty="0" smtClean="0"/>
+              <a:t>Microsoft Gold Certified Partner</a:t>
+            </a:r>
+            <a:endParaRPr lang="en-US" dirty="0"/>
+          </a:p>
+        </p:txBody>
+      </p:sp>
+      <p:sp>
+        <p:nvSpPr>
+          <p:cNvPr id="4" name="Slide Number Placeholder 3"/>
+          <p:cNvSpPr>
+            <a:spLocks noGrp="1"/>
+          </p:cNvSpPr>
+          <p:nvPr>
+            <p:ph type="sldNum" sz="quarter" idx="10"/>
+          </p:nvPr>
+        </p:nvSpPr>
+        <p:spPr/>
+        <p:txBody>
+          <a:bodyPr/>
+          <a:lstStyle/>
+          <a:p>
+            <a:pPr>
+              <a:defRPr/>
+            </a:pPr>
+            <a:fld id="{58452FF4-89E3-4D1B-9927-2DBDC00E58D7}" type="slidenum">
+              <a:rPr lang="en-US" smtClean="0"/>
+              <a:pPr>
+                <a:defRPr/>
+              </a:pPr>
+              <a:t>3</a:t>
+            </a:fld>
+            <a:endParaRPr lang="en-US" dirty="0"/>
+          </a:p>
+        </p:txBody>
+      </p:sp>
+      <p:pic>
+        <p:nvPicPr>
+          <p:cNvPr id="29698" name="Picture 2" descr="http://media.sagabg.net/img/thumbs/2008/11/19/telerik_jpg_606x606_q85.jpg"/>
+          <p:cNvPicPr>
+            <a:picLocks noChangeAspect="1" noChangeArrowheads="1"/>
+          </p:cNvPicPr>
+          <p:nvPr/>
+        </p:nvPicPr>
+        <p:blipFill>
+          <a:blip r:embed="rId2" cstate="screen">
+            <a:extLst>
+              <a:ext uri="{28A0092B-C50C-407E-A947-70E740481C1C}">
+                <a14:useLocalDpi xmlns:a14="http://schemas.microsoft.com/office/drawing/2010/main" val="0"/>
+              </a:ext>
+            </a:extLst>
+          </a:blip>
+          <a:srcRect/>
+          <a:stretch>
+            <a:fillRect/>
+          </a:stretch>
+        </p:blipFill>
+        <p:spPr bwMode="auto">
+          <a:xfrm>
+            <a:off x="6705600" y="5347735"/>
+            <a:ext cx="1981200" cy="1281665"/>
+          </a:xfrm>
+          <a:prstGeom prst="roundRect">
+            <a:avLst>
+              <a:gd name="adj" fmla="val 8594"/>
+            </a:avLst>
+          </a:prstGeom>
+          <a:solidFill>
+            <a:srgbClr val="FFFFFF">
+              <a:shade val="85000"/>
+            </a:srgbClr>
+          </a:solidFill>
+          <a:ln>
+            <a:noFill/>
+          </a:ln>
+          <a:effectLst/>
+        </p:spPr>
+      </p:pic>
+    </p:spTree>
+    <p:extLst>
+      <p:ext uri="{BB962C8B-B14F-4D97-AF65-F5344CB8AC3E}">
+        <p14:creationId xmlns:p14="http://schemas.microsoft.com/office/powerpoint/2010/main" val="1065257488"/>
+      </p:ext>
+    </p:extLst>
+  </p:cSld>
+  <p:clrMapOvr>
+    <a:masterClrMapping/>
+  </p:clrMapOvr>
+  <p:timing>
+    <p:tnLst>
+      <p:par>
+        <p:cTn id="1" dur="indefinite" restart="never" nodeType="tmRoot"/>
+      </p:par>
+    </p:tnLst>
+  </p:timing>
+</p:sld>
+</file>
+
+<file path=ppt/slides/slide30.xml><?xml version="1.0" encoding="utf-8"?>
 <p:sld xmlns:a="http://schemas.openxmlformats.org/drawingml/2006/main" xmlns:r="http://schemas.openxmlformats.org/officeDocument/2006/relationships" xmlns:p="http://schemas.openxmlformats.org/presentationml/2006/main">
   <p:cSld>
     <p:spTree>
@@ -12402,229 +13032,7 @@
 </p:sld>
 </file>
 
-<file path=ppt/slides/slide3.xml><?xml version="1.0" encoding="utf-8"?>
-<p:sld xmlns:a="http://schemas.openxmlformats.org/drawingml/2006/main" xmlns:r="http://schemas.openxmlformats.org/officeDocument/2006/relationships" xmlns:p="http://schemas.openxmlformats.org/presentationml/2006/main">
-  <p:cSld>
-    <p:spTree>
-      <p:nvGrpSpPr>
-        <p:cNvPr id="1" name=""/>
-        <p:cNvGrpSpPr/>
-        <p:nvPr/>
-      </p:nvGrpSpPr>
-      <p:grpSpPr>
-        <a:xfrm>
-          <a:off x="0" y="0"/>
-          <a:ext cx="0" cy="0"/>
-          <a:chOff x="0" y="0"/>
-          <a:chExt cx="0" cy="0"/>
-        </a:xfrm>
-      </p:grpSpPr>
-      <p:sp>
-        <p:nvSpPr>
-          <p:cNvPr id="2" name="Title 1"/>
-          <p:cNvSpPr>
-            <a:spLocks noGrp="1"/>
-          </p:cNvSpPr>
-          <p:nvPr>
-            <p:ph type="title"/>
-          </p:nvPr>
-        </p:nvSpPr>
-        <p:spPr/>
-        <p:txBody>
-          <a:bodyPr/>
-          <a:lstStyle/>
-          <a:p>
-            <a:r>
-              <a:rPr lang="en-US" dirty="0" smtClean="0"/>
-              <a:t>About Telerik</a:t>
-            </a:r>
-            <a:endParaRPr lang="en-US" dirty="0"/>
-          </a:p>
-        </p:txBody>
-      </p:sp>
-      <p:sp>
-        <p:nvSpPr>
-          <p:cNvPr id="3" name="Content Placeholder 2"/>
-          <p:cNvSpPr>
-            <a:spLocks noGrp="1"/>
-          </p:cNvSpPr>
-          <p:nvPr>
-            <p:ph idx="1"/>
-          </p:nvPr>
-        </p:nvSpPr>
-        <p:spPr/>
-        <p:txBody>
-          <a:bodyPr/>
-          <a:lstStyle/>
-          <a:p>
-            <a:pPr>
-              <a:tabLst/>
-            </a:pPr>
-            <a:r>
-              <a:rPr lang="en-US" dirty="0" smtClean="0"/>
-              <a:t>What </a:t>
-            </a:r>
-            <a:r>
-              <a:rPr lang="en-US" dirty="0" smtClean="0">
-                <a:solidFill>
-                  <a:schemeClr val="accent5">
-                    <a:lumMod val="20000"/>
-                    <a:lumOff val="80000"/>
-                  </a:schemeClr>
-                </a:solidFill>
-              </a:rPr>
-              <a:t>Telerik</a:t>
-            </a:r>
-            <a:r>
-              <a:rPr lang="en-US" dirty="0" smtClean="0"/>
-              <a:t> does?</a:t>
-            </a:r>
-          </a:p>
-          <a:p>
-            <a:pPr lvl="1"/>
-            <a:r>
-              <a:rPr lang="en-US" dirty="0" smtClean="0"/>
-              <a:t>Leading vendor of ASP.NET AJAX, Silverlight, WPF and ASP.NET MVC components, ORM, Reporting, and CMS solutions and VS Plugins</a:t>
-            </a:r>
-          </a:p>
-          <a:p>
-            <a:r>
-              <a:rPr lang="en-US" dirty="0" smtClean="0"/>
-              <a:t>Headquartered in Bulgaria</a:t>
-            </a:r>
-          </a:p>
-          <a:p>
-            <a:pPr lvl="1"/>
-            <a:r>
-              <a:rPr lang="en-US" dirty="0" smtClean="0"/>
-              <a:t>With offices in USA, Germany, Australia, India</a:t>
-            </a:r>
-          </a:p>
-          <a:p>
-            <a:pPr lvl="1"/>
-            <a:r>
-              <a:rPr lang="en-US" dirty="0" smtClean="0">
-                <a:latin typeface="Consolas" pitchFamily="49" charset="0"/>
-                <a:cs typeface="Consolas" pitchFamily="49" charset="0"/>
-              </a:rPr>
-              <a:t>450</a:t>
-            </a:r>
-            <a:r>
-              <a:rPr lang="en-US" dirty="0" smtClean="0"/>
-              <a:t> </a:t>
-            </a:r>
-            <a:r>
-              <a:rPr lang="en-US" dirty="0" smtClean="0"/>
-              <a:t>employees – mostly developers</a:t>
-            </a:r>
-          </a:p>
-          <a:p>
-            <a:r>
-              <a:rPr lang="en-US" dirty="0" smtClean="0"/>
-              <a:t>Employer #1 in Bulgaria for 2010</a:t>
-            </a:r>
-          </a:p>
-          <a:p>
-            <a:r>
-              <a:rPr lang="en-US" dirty="0" smtClean="0"/>
-              <a:t>Microsoft Gold Certified Partner</a:t>
-            </a:r>
-            <a:endParaRPr lang="en-US" dirty="0"/>
-          </a:p>
-        </p:txBody>
-      </p:sp>
-      <p:sp>
-        <p:nvSpPr>
-          <p:cNvPr id="4" name="Slide Number Placeholder 3"/>
-          <p:cNvSpPr>
-            <a:spLocks noGrp="1"/>
-          </p:cNvSpPr>
-          <p:nvPr>
-            <p:ph type="sldNum" sz="quarter" idx="10"/>
-          </p:nvPr>
-        </p:nvSpPr>
-        <p:spPr/>
-        <p:txBody>
-          <a:bodyPr/>
-          <a:lstStyle/>
-          <a:p>
-            <a:pPr>
-              <a:defRPr/>
-            </a:pPr>
-            <a:fld id="{58452FF4-89E3-4D1B-9927-2DBDC00E58D7}" type="slidenum">
-              <a:rPr lang="en-US" smtClean="0"/>
-              <a:pPr>
-                <a:defRPr/>
-              </a:pPr>
-              <a:t>3</a:t>
-            </a:fld>
-            <a:endParaRPr lang="en-US" dirty="0"/>
-          </a:p>
-        </p:txBody>
-      </p:sp>
-      <p:pic>
-        <p:nvPicPr>
-          <p:cNvPr id="29698" name="Picture 2" descr="http://media.sagabg.net/img/thumbs/2008/11/19/telerik_jpg_606x606_q85.jpg"/>
-          <p:cNvPicPr>
-            <a:picLocks noChangeAspect="1" noChangeArrowheads="1"/>
-          </p:cNvPicPr>
-          <p:nvPr/>
-        </p:nvPicPr>
-        <p:blipFill>
-          <a:blip r:embed="rId2" cstate="screen">
-            <a:extLst>
-              <a:ext uri="{28A0092B-C50C-407E-A947-70E740481C1C}">
-                <a14:useLocalDpi xmlns:a14="http://schemas.microsoft.com/office/drawing/2010/main" val="0"/>
-              </a:ext>
-            </a:extLst>
-          </a:blip>
-          <a:srcRect/>
-          <a:stretch>
-            <a:fillRect/>
-          </a:stretch>
-        </p:blipFill>
-        <p:spPr bwMode="auto">
-          <a:xfrm>
-            <a:off x="6781800" y="5226379"/>
-            <a:ext cx="1981200" cy="1281665"/>
-          </a:xfrm>
-          <a:prstGeom prst="roundRect">
-            <a:avLst>
-              <a:gd name="adj" fmla="val 8594"/>
-            </a:avLst>
-          </a:prstGeom>
-          <a:solidFill>
-            <a:srgbClr val="FFFFFF">
-              <a:shade val="85000"/>
-            </a:srgbClr>
-          </a:solidFill>
-          <a:ln>
-            <a:noFill/>
-          </a:ln>
-          <a:effectLst/>
-        </p:spPr>
-      </p:pic>
-    </p:spTree>
-    <p:extLst>
-      <p:ext uri="{BB962C8B-B14F-4D97-AF65-F5344CB8AC3E}">
-        <p14:creationId xmlns:p14="http://schemas.microsoft.com/office/powerpoint/2010/main" val="1065257488"/>
-      </p:ext>
-    </p:extLst>
-  </p:cSld>
-  <p:clrMapOvr>
-    <a:masterClrMapping/>
-  </p:clrMapOvr>
-  <p:timing>
-    <p:tnLst>
-      <p:par>
-        <p:cTn id="1" dur="indefinite" restart="never" nodeType="tmRoot"/>
-      </p:par>
-    </p:tnLst>
-  </p:timing>
-</p:sld>
-</file>
-
-<file path=ppt/slides/slide30.xml><?xml version="1.0" encoding="utf-8"?>
+<file path=ppt/slides/slide31.xml><?xml version="1.0" encoding="utf-8"?>
 <p:sld xmlns:a="http://schemas.openxmlformats.org/drawingml/2006/main" xmlns:r="http://schemas.openxmlformats.org/officeDocument/2006/relationships" xmlns:p="http://schemas.openxmlformats.org/presentationml/2006/main">
   <p:cSld>
     <p:spTree>
@@ -13002,7 +13410,7 @@
               <a:pPr>
                 <a:defRPr/>
               </a:pPr>
-              <a:t>30</a:t>
+              <a:t>31</a:t>
             </a:fld>
             <a:endParaRPr lang="en-US" dirty="0"/>
           </a:p>
@@ -13023,7 +13431,7 @@
 </p:sld>
 </file>
 
-<file path=ppt/slides/slide31.xml><?xml version="1.0" encoding="utf-8"?>
+<file path=ppt/slides/slide32.xml><?xml version="1.0" encoding="utf-8"?>
 <p:sld xmlns:a="http://schemas.openxmlformats.org/drawingml/2006/main" xmlns:r="http://schemas.openxmlformats.org/officeDocument/2006/relationships" xmlns:p="http://schemas.openxmlformats.org/presentationml/2006/main">
   <p:cSld>
     <p:spTree>
@@ -13098,16 +13506,6 @@
                 </a:solidFill>
               </a14:hiddenFill>
             </a:ext>
-            <a:ext uri="{91240B29-F687-4F45-9708-019B960494DF}">
-              <a14:hiddenLine xmlns:a14="http://schemas.microsoft.com/office/drawing/2010/main" w="9525">
-                <a:solidFill>
-                  <a:schemeClr val="tx1"/>
-                </a:solidFill>
-                <a:miter lim="800000"/>
-                <a:headEnd/>
-                <a:tailEnd/>
-              </a14:hiddenLine>
-            </a:ext>
           </a:extLst>
         </p:spPr>
       </p:pic>
@@ -13296,7 +13694,7 @@
               <a:pPr>
                 <a:defRPr/>
               </a:pPr>
-              <a:t>31</a:t>
+              <a:t>32</a:t>
             </a:fld>
             <a:endParaRPr lang="en-US" dirty="0"/>
           </a:p>
@@ -13414,7 +13812,7 @@
 </p:sld>
 </file>
 
-<file path=ppt/slides/slide32.xml><?xml version="1.0" encoding="utf-8"?>
+<file path=ppt/slides/slide33.xml><?xml version="1.0" encoding="utf-8"?>
 <p:sld xmlns:a="http://schemas.openxmlformats.org/drawingml/2006/main" xmlns:r="http://schemas.openxmlformats.org/officeDocument/2006/relationships" xmlns:p="http://schemas.openxmlformats.org/presentationml/2006/main">
   <p:cSld>
     <p:spTree>
@@ -14316,11 +14714,7 @@
             </a:pPr>
             <a:r>
               <a:rPr lang="en-US" dirty="0" smtClean="0"/>
-              <a:t>Developer </a:t>
-            </a:r>
-            <a:r>
-              <a:rPr lang="en-US" dirty="0" smtClean="0"/>
-              <a:t>Support</a:t>
+              <a:t>Developer Support</a:t>
             </a:r>
           </a:p>
           <a:p>
@@ -14341,18 +14735,7 @@
                   </a:schemeClr>
                 </a:solidFill>
               </a:rPr>
-              <a:t>School </a:t>
-            </a:r>
-            <a:r>
-              <a:rPr lang="en-US" dirty="0" smtClean="0">
-                <a:solidFill>
-                  <a:schemeClr val="accent5">
-                    <a:lumMod val="20000"/>
-                    <a:lumOff val="80000"/>
-                  </a:schemeClr>
-                </a:solidFill>
-              </a:rPr>
-              <a:t>Academy</a:t>
+              <a:t>School Academy</a:t>
             </a:r>
           </a:p>
           <a:p>
@@ -15834,23 +16217,6 @@
               </a:rPr>
               <a:t>Courses for Students</a:t>
             </a:r>
-            <a:endParaRPr lang="en-US" sz="2800" b="1" dirty="0" smtClean="0">
-              <a:solidFill>
-                <a:srgbClr val="CCFF66">
-                  <a:lumMod val="40000"/>
-                  <a:lumOff val="60000"/>
-                </a:srgbClr>
-              </a:solidFill>
-              <a:effectLst>
-                <a:outerShdw blurRad="38100" dist="38100" dir="2700000" algn="tl">
-                  <a:srgbClr val="000000">
-                    <a:alpha val="43137"/>
-                  </a:srgbClr>
-                </a:outerShdw>
-              </a:effectLst>
-              <a:latin typeface="+mj-lt"/>
-              <a:cs typeface="Consolas" pitchFamily="49" charset="0"/>
-            </a:endParaRPr>
           </a:p>
         </p:txBody>
       </p:sp>
@@ -16168,7 +16534,66 @@
                 <a:latin typeface="+mj-lt"/>
                 <a:cs typeface="Consolas" pitchFamily="49" charset="0"/>
               </a:rPr>
-              <a:t>Web Applications Development with </a:t>
+              <a:t>Web </a:t>
+            </a:r>
+            <a:r>
+              <a:rPr lang="en-US" sz="2000" b="1" dirty="0" smtClean="0">
+                <a:solidFill>
+                  <a:srgbClr val="CCFF66">
+                    <a:lumMod val="40000"/>
+                    <a:lumOff val="60000"/>
+                  </a:srgbClr>
+                </a:solidFill>
+                <a:effectLst>
+                  <a:outerShdw blurRad="38100" dist="38100" dir="2700000" algn="tl">
+                    <a:srgbClr val="000000">
+                      <a:alpha val="43137"/>
+                    </a:srgbClr>
+                  </a:outerShdw>
+                </a:effectLst>
+                <a:latin typeface="+mj-lt"/>
+                <a:cs typeface="Consolas" pitchFamily="49" charset="0"/>
+              </a:rPr>
+              <a:t>Applications</a:t>
+            </a:r>
+            <a:br>
+              <a:rPr lang="en-US" sz="2000" b="1" dirty="0" smtClean="0">
+                <a:solidFill>
+                  <a:srgbClr val="CCFF66">
+                    <a:lumMod val="40000"/>
+                    <a:lumOff val="60000"/>
+                  </a:srgbClr>
+                </a:solidFill>
+                <a:effectLst>
+                  <a:outerShdw blurRad="38100" dist="38100" dir="2700000" algn="tl">
+                    <a:srgbClr val="000000">
+                      <a:alpha val="43137"/>
+                    </a:srgbClr>
+                  </a:outerShdw>
+                </a:effectLst>
+                <a:latin typeface="+mj-lt"/>
+                <a:cs typeface="Consolas" pitchFamily="49" charset="0"/>
+              </a:rPr>
+            </a:br>
+            <a:r>
+              <a:rPr lang="en-US" sz="2000" b="1" dirty="0" smtClean="0">
+                <a:solidFill>
+                  <a:srgbClr val="CCFF66">
+                    <a:lumMod val="40000"/>
+                    <a:lumOff val="60000"/>
+                  </a:srgbClr>
+                </a:solidFill>
+                <a:effectLst>
+                  <a:outerShdw blurRad="38100" dist="38100" dir="2700000" algn="tl">
+                    <a:srgbClr val="000000">
+                      <a:alpha val="43137"/>
+                    </a:srgbClr>
+                  </a:outerShdw>
+                </a:effectLst>
+                <a:latin typeface="+mj-lt"/>
+                <a:cs typeface="Consolas" pitchFamily="49" charset="0"/>
+              </a:rPr>
+              <a:t>with </a:t>
             </a:r>
             <a:r>
               <a:rPr lang="en-US" sz="2000" b="1" dirty="0">
@@ -16359,27 +16784,7 @@
                 <a:latin typeface="+mj-lt"/>
                 <a:cs typeface="Consolas" pitchFamily="49" charset="0"/>
               </a:rPr>
-              <a:t>High-Quality </a:t>
-            </a:r>
-            <a:r>
-              <a:rPr lang="en-US" sz="2000" b="1" dirty="0" smtClean="0">
-                <a:solidFill>
-                  <a:srgbClr val="CCFF66">
-                    <a:lumMod val="40000"/>
-                    <a:lumOff val="60000"/>
-                  </a:srgbClr>
-                </a:solidFill>
-                <a:effectLst>
-                  <a:outerShdw blurRad="38100" dist="38100" dir="2700000" algn="tl">
-                    <a:srgbClr val="000000">
-                      <a:alpha val="43137"/>
-                    </a:srgbClr>
-                  </a:outerShdw>
-                </a:effectLst>
-                <a:latin typeface="+mj-lt"/>
-                <a:cs typeface="Consolas" pitchFamily="49" charset="0"/>
-              </a:rPr>
-              <a:t>Programming Code</a:t>
+              <a:t>High-Quality Programming Code</a:t>
             </a:r>
             <a:br>
               <a:rPr lang="en-US" sz="2000" b="1" dirty="0" smtClean="0">
@@ -16728,45 +17133,8 @@
                 <a:latin typeface="+mj-lt"/>
                 <a:cs typeface="Consolas" pitchFamily="49" charset="0"/>
               </a:rPr>
-              <a:t>Web </a:t>
-            </a:r>
-            <a:r>
-              <a:rPr lang="en-US" sz="2000" b="1" dirty="0" smtClean="0">
-                <a:solidFill>
-                  <a:srgbClr val="CCFF66">
-                    <a:lumMod val="40000"/>
-                    <a:lumOff val="60000"/>
-                  </a:srgbClr>
-                </a:solidFill>
-                <a:effectLst>
-                  <a:outerShdw blurRad="38100" dist="38100" dir="2700000" algn="tl">
-                    <a:srgbClr val="000000">
-                      <a:alpha val="43137"/>
-                    </a:srgbClr>
-                  </a:outerShdw>
-                </a:effectLst>
-                <a:latin typeface="+mj-lt"/>
-                <a:cs typeface="Consolas" pitchFamily="49" charset="0"/>
-              </a:rPr>
-              <a:t>Front-End Development</a:t>
-            </a:r>
-            <a:endParaRPr lang="en-US" sz="2000" b="1" dirty="0" smtClean="0">
-              <a:solidFill>
-                <a:srgbClr val="CCFF66">
-                  <a:lumMod val="40000"/>
-                  <a:lumOff val="60000"/>
-                </a:srgbClr>
-              </a:solidFill>
-              <a:effectLst>
-                <a:outerShdw blurRad="38100" dist="38100" dir="2700000" algn="tl">
-                  <a:srgbClr val="000000">
-                    <a:alpha val="43137"/>
-                  </a:srgbClr>
-                </a:outerShdw>
-              </a:effectLst>
-              <a:latin typeface="+mj-lt"/>
-              <a:cs typeface="Consolas" pitchFamily="49" charset="0"/>
-            </a:endParaRPr>
+              <a:t>Web Front-End Development</a:t>
+            </a:r>
           </a:p>
           <a:p>
             <a:pPr algn="ctr"/>
@@ -17090,47 +17458,7 @@
                 <a:latin typeface="+mj-lt"/>
                 <a:cs typeface="Consolas" pitchFamily="49" charset="0"/>
               </a:rPr>
-              <a:t>Web </a:t>
-            </a:r>
-            <a:r>
-              <a:rPr lang="en-US" sz="2000" b="1" dirty="0" smtClean="0">
-                <a:solidFill>
-                  <a:srgbClr val="CCFF66">
-                    <a:lumMod val="40000"/>
-                    <a:lumOff val="60000"/>
-                  </a:srgbClr>
-                </a:solidFill>
-                <a:effectLst>
-                  <a:outerShdw blurRad="38100" dist="38100" dir="2700000" algn="tl">
-                    <a:srgbClr val="000000">
-                      <a:alpha val="43137"/>
-                    </a:srgbClr>
-                  </a:outerShdw>
-                </a:effectLst>
-                <a:latin typeface="+mj-lt"/>
-                <a:cs typeface="Consolas" pitchFamily="49" charset="0"/>
-              </a:rPr>
-              <a:t>Client-Side </a:t>
-            </a:r>
-            <a:r>
-              <a:rPr lang="en-US" sz="2000" b="1" dirty="0" smtClean="0">
-                <a:solidFill>
-                  <a:srgbClr val="CCFF66">
-                    <a:lumMod val="40000"/>
-                    <a:lumOff val="60000"/>
-                  </a:srgbClr>
-                </a:solidFill>
-                <a:effectLst>
-                  <a:outerShdw blurRad="38100" dist="38100" dir="2700000" algn="tl">
-                    <a:srgbClr val="000000">
-                      <a:alpha val="43137"/>
-                    </a:srgbClr>
-                  </a:outerShdw>
-                </a:effectLst>
-                <a:latin typeface="+mj-lt"/>
-                <a:cs typeface="Consolas" pitchFamily="49" charset="0"/>
-              </a:rPr>
-              <a:t>Development </a:t>
+              <a:t>Web Client-Side Development </a:t>
             </a:r>
             <a:br>
               <a:rPr lang="en-US" sz="2000" b="1" dirty="0" smtClean="0">
@@ -17310,11 +17638,7 @@
           <a:p>
             <a:r>
               <a:rPr lang="en-US" dirty="0" smtClean="0"/>
-              <a:t>About the </a:t>
-            </a:r>
-            <a:r>
-              <a:rPr lang="en-US" dirty="0" smtClean="0"/>
-              <a:t>MVC Course</a:t>
+              <a:t>About the MVC Course</a:t>
             </a:r>
             <a:endParaRPr lang="en-US" dirty="0"/>
           </a:p>
@@ -17355,11 +17679,7 @@
             </a:r>
             <a:r>
               <a:rPr lang="en-US" dirty="0" smtClean="0"/>
-              <a:t>ASP.NET </a:t>
-            </a:r>
-            <a:r>
-              <a:rPr lang="en-US" dirty="0" smtClean="0"/>
-              <a:t>MVC"</a:t>
+              <a:t>ASP.NET MVC"</a:t>
             </a:r>
             <a:br>
               <a:rPr lang="en-US" dirty="0" smtClean="0"/>
@@ -17368,7 +17688,6 @@
               <a:rPr lang="en-US" dirty="0" smtClean="0"/>
               <a:t>course objectives</a:t>
             </a:r>
-            <a:endParaRPr lang="en-US" dirty="0" smtClean="0"/>
           </a:p>
           <a:p>
             <a:pPr lvl="1">
@@ -17448,11 +17767,7 @@
             </a:pPr>
             <a:r>
               <a:rPr lang="en-US" dirty="0" smtClean="0"/>
-              <a:t>ASP.NET </a:t>
-            </a:r>
-            <a:r>
-              <a:rPr lang="en-US" dirty="0" smtClean="0"/>
-              <a:t>MVC</a:t>
+              <a:t>ASP.NET MVC</a:t>
             </a:r>
           </a:p>
         </p:txBody>
@@ -17854,9 +18169,9 @@
           <a:p>
             <a:r>
               <a:rPr lang="en-US" dirty="0" smtClean="0"/>
-              <a:t>Registration</a:t>
-            </a:r>
-            <a:endParaRPr lang="en-US" dirty="0"/>
+              <a:t>Required Software</a:t>
+            </a:r>
+            <a:endParaRPr lang="bg-BG" dirty="0"/>
           </a:p>
         </p:txBody>
       </p:sp>
@@ -17872,108 +18187,70 @@
         </p:nvSpPr>
         <p:spPr>
           <a:xfrm>
-            <a:off x="228600" y="838200"/>
-            <a:ext cx="8686800" cy="5638800"/>
+            <a:off x="228600" y="762000"/>
+            <a:ext cx="8686800" cy="5867400"/>
           </a:xfrm>
         </p:spPr>
         <p:txBody>
           <a:bodyPr/>
           <a:lstStyle/>
           <a:p>
-            <a:pPr>
-              <a:lnSpc>
-                <a:spcPct val="100000"/>
-              </a:lnSpc>
-            </a:pPr>
             <a:r>
               <a:rPr lang="en-US" dirty="0" smtClean="0"/>
-              <a:t>All students should register for the course at:</a:t>
-            </a:r>
-          </a:p>
-          <a:p>
-            <a:pPr marL="0" indent="0" algn="ctr">
-              <a:lnSpc>
-                <a:spcPct val="100000"/>
-              </a:lnSpc>
-              <a:buNone/>
-            </a:pPr>
-            <a:endParaRPr lang="en-US" sz="4400" dirty="0" smtClean="0"/>
-          </a:p>
-          <a:p>
-            <a:pPr lvl="0">
-              <a:lnSpc>
-                <a:spcPct val="100000"/>
-              </a:lnSpc>
-              <a:spcBef>
-                <a:spcPts val="1800"/>
-              </a:spcBef>
-              <a:buClr>
-                <a:srgbClr val="46A6BD">
-                  <a:lumMod val="40000"/>
-                  <a:lumOff val="60000"/>
-                </a:srgbClr>
-              </a:buClr>
-            </a:pPr>
+              <a:t>Visual Studio 2010</a:t>
+            </a:r>
+          </a:p>
+          <a:p>
+            <a:pPr lvl="1"/>
             <a:r>
               <a:rPr lang="en-US" dirty="0" smtClean="0"/>
-              <a:t>Registration is important!</a:t>
-            </a:r>
-          </a:p>
-          <a:p>
-            <a:pPr lvl="1">
-              <a:lnSpc>
-                <a:spcPct val="100000"/>
-              </a:lnSpc>
-              <a:buClr>
-                <a:srgbClr val="46A6BD">
-                  <a:lumMod val="40000"/>
-                  <a:lumOff val="60000"/>
-                </a:srgbClr>
-              </a:buClr>
-            </a:pPr>
+              <a:t>With Service Pack 1 and latest updates</a:t>
+            </a:r>
+          </a:p>
+          <a:p>
+            <a:r>
+              <a:rPr lang="en-US" dirty="0"/>
+              <a:t>Web Platform </a:t>
+            </a:r>
             <a:r>
               <a:rPr lang="en-US" dirty="0" smtClean="0"/>
-              <a:t>Registration allows the trainers contact you regarding the course projects, exams, etc.</a:t>
-            </a:r>
-          </a:p>
-          <a:p>
-            <a:pPr lvl="1">
-              <a:lnSpc>
-                <a:spcPct val="100000"/>
-              </a:lnSpc>
-              <a:buClr>
-                <a:srgbClr val="46A6BD">
-                  <a:lumMod val="40000"/>
-                  <a:lumOff val="60000"/>
-                </a:srgbClr>
-              </a:buClr>
-            </a:pPr>
+              <a:t>Installer (Web PI) will install everything you need for developing ASP.NET MVC applications</a:t>
+            </a:r>
+          </a:p>
+          <a:p>
+            <a:pPr lvl="1"/>
+            <a:r>
+              <a:rPr lang="en-US" dirty="0">
+                <a:hlinkClick r:id="rId2"/>
+              </a:rPr>
+              <a:t>http://</a:t>
+            </a:r>
+            <a:r>
+              <a:rPr lang="en-US" dirty="0" smtClean="0">
+                <a:hlinkClick r:id="rId2"/>
+              </a:rPr>
+              <a:t>www.asp.net/mvc</a:t>
+            </a:r>
+            <a:endParaRPr lang="en-US" dirty="0" smtClean="0"/>
+          </a:p>
+          <a:p>
             <a:r>
               <a:rPr lang="en-US" dirty="0" smtClean="0"/>
-              <a:t>Registered students are assigned to work on one of the course projects</a:t>
-            </a:r>
-          </a:p>
-          <a:p>
-            <a:pPr lvl="0">
-              <a:lnSpc>
-                <a:spcPct val="100000"/>
-              </a:lnSpc>
-              <a:buClr>
-                <a:srgbClr val="46A6BD">
-                  <a:lumMod val="40000"/>
-                  <a:lumOff val="60000"/>
-                </a:srgbClr>
-              </a:buClr>
-            </a:pPr>
-            <a:r>
-              <a:rPr lang="en-US" dirty="0"/>
-              <a:t>If you have any questions you can contact us</a:t>
-            </a:r>
+              <a:t>Microsoft SQL Server 2008 R2</a:t>
+            </a:r>
+          </a:p>
+          <a:p>
             <a:r>
               <a:rPr lang="en-US" dirty="0" smtClean="0"/>
-              <a:t>:</a:t>
-            </a:r>
-            <a:endParaRPr lang="en-US" dirty="0"/>
+              <a:t>SQL Server Management Studio</a:t>
+            </a:r>
+          </a:p>
+          <a:p>
+            <a:r>
+              <a:rPr lang="en-US" dirty="0" smtClean="0"/>
+              <a:t>You may also want to try latest version of the ASP.NET MVC 4 (development preview)</a:t>
+            </a:r>
+            <a:endParaRPr lang="bg-BG" dirty="0"/>
           </a:p>
         </p:txBody>
       </p:sp>
@@ -18006,215 +18283,16 @@
           </a:p>
         </p:txBody>
       </p:sp>
-      <p:sp>
-        <p:nvSpPr>
-          <p:cNvPr id="5" name="Rounded Rectangle 4"/>
-          <p:cNvSpPr/>
-          <p:nvPr/>
-        </p:nvSpPr>
-        <p:spPr>
-          <a:xfrm>
-            <a:off x="914400" y="1514354"/>
-            <a:ext cx="7315200" cy="821130"/>
-          </a:xfrm>
-          <a:prstGeom prst="roundRect">
-            <a:avLst>
-              <a:gd name="adj" fmla="val 8117"/>
-            </a:avLst>
-          </a:prstGeom>
-          <a:solidFill>
-            <a:schemeClr val="accent5">
-              <a:lumMod val="40000"/>
-              <a:lumOff val="60000"/>
-              <a:alpha val="15000"/>
-            </a:schemeClr>
-          </a:solidFill>
-          <a:ln w="12700">
-            <a:solidFill>
-              <a:schemeClr val="accent5">
-                <a:lumMod val="60000"/>
-                <a:lumOff val="40000"/>
-              </a:schemeClr>
-            </a:solidFill>
-          </a:ln>
-        </p:spPr>
-        <p:txBody>
-          <a:bodyPr wrap="square" tIns="108000" bIns="180000" anchor="ctr" anchorCtr="0">
-            <a:spAutoFit/>
-          </a:bodyPr>
-          <a:lstStyle/>
-          <a:p>
-            <a:pPr algn="ctr" eaLnBrk="0" hangingPunct="0">
-              <a:spcBef>
-                <a:spcPts val="0"/>
-              </a:spcBef>
-              <a:buClr>
-                <a:schemeClr val="accent5">
-                  <a:lumMod val="40000"/>
-                  <a:lumOff val="60000"/>
-                </a:schemeClr>
-              </a:buClr>
-              <a:buSzPct val="70000"/>
-              <a:buFont typeface="Wingdings 2" pitchFamily="18" charset="2"/>
-              <a:buNone/>
-            </a:pPr>
-            <a:r>
-              <a:rPr lang="en-US" sz="3200" b="1" dirty="0">
-                <a:solidFill>
-                  <a:srgbClr val="8CF4F2"/>
-                </a:solidFill>
-                <a:effectLst>
-                  <a:outerShdw blurRad="38100" dist="38100" dir="2700000" algn="tl">
-                    <a:srgbClr val="000000">
-                      <a:alpha val="43137"/>
-                    </a:srgbClr>
-                  </a:outerShdw>
-                </a:effectLst>
-                <a:latin typeface="Consolas" pitchFamily="49" charset="0"/>
-                <a:cs typeface="Consolas" pitchFamily="49" charset="0"/>
-                <a:hlinkClick r:id="rId2"/>
-              </a:rPr>
-              <a:t>http://</a:t>
-            </a:r>
-            <a:r>
-              <a:rPr lang="en-US" sz="3200" b="1" dirty="0" smtClean="0">
-                <a:solidFill>
-                  <a:srgbClr val="8CF4F2"/>
-                </a:solidFill>
-                <a:effectLst>
-                  <a:outerShdw blurRad="38100" dist="38100" dir="2700000" algn="tl">
-                    <a:srgbClr val="000000">
-                      <a:alpha val="43137"/>
-                    </a:srgbClr>
-                  </a:outerShdw>
-                </a:effectLst>
-                <a:latin typeface="Consolas" pitchFamily="49" charset="0"/>
-                <a:cs typeface="Consolas" pitchFamily="49" charset="0"/>
-                <a:hlinkClick r:id="rId2"/>
-              </a:rPr>
-              <a:t>mvccourse.telerik.com</a:t>
-            </a:r>
-            <a:endParaRPr lang="en-US" sz="3200" b="1" dirty="0">
-              <a:solidFill>
-                <a:srgbClr val="8CF4F2"/>
-              </a:solidFill>
-              <a:effectLst>
-                <a:outerShdw blurRad="38100" dist="38100" dir="2700000" algn="tl">
-                  <a:srgbClr val="000000">
-                    <a:alpha val="43137"/>
-                  </a:srgbClr>
-                </a:outerShdw>
-              </a:effectLst>
-              <a:latin typeface="Consolas" pitchFamily="49" charset="0"/>
-              <a:cs typeface="Consolas" pitchFamily="49" charset="0"/>
-            </a:endParaRPr>
-          </a:p>
-        </p:txBody>
-      </p:sp>
-      <p:sp>
-        <p:nvSpPr>
-          <p:cNvPr id="6" name="Rounded Rectangle 5"/>
-          <p:cNvSpPr/>
-          <p:nvPr/>
-        </p:nvSpPr>
-        <p:spPr>
-          <a:xfrm>
-            <a:off x="914400" y="5905492"/>
-            <a:ext cx="7315200" cy="680379"/>
-          </a:xfrm>
-          <a:prstGeom prst="roundRect">
-            <a:avLst>
-              <a:gd name="adj" fmla="val 8117"/>
-            </a:avLst>
-          </a:prstGeom>
-          <a:solidFill>
-            <a:schemeClr val="accent5">
-              <a:lumMod val="40000"/>
-              <a:lumOff val="60000"/>
-              <a:alpha val="15000"/>
-            </a:schemeClr>
-          </a:solidFill>
-          <a:ln w="12700">
-            <a:solidFill>
-              <a:schemeClr val="accent5">
-                <a:lumMod val="60000"/>
-                <a:lumOff val="40000"/>
-              </a:schemeClr>
-            </a:solidFill>
-          </a:ln>
-        </p:spPr>
-        <p:txBody>
-          <a:bodyPr wrap="square" tIns="72000" bIns="144000" anchor="ctr" anchorCtr="0">
-            <a:spAutoFit/>
-          </a:bodyPr>
-          <a:lstStyle/>
-          <a:p>
-            <a:pPr algn="ctr" eaLnBrk="0" hangingPunct="0">
-              <a:spcBef>
-                <a:spcPts val="0"/>
-              </a:spcBef>
-              <a:buClr>
-                <a:schemeClr val="accent5">
-                  <a:lumMod val="40000"/>
-                  <a:lumOff val="60000"/>
-                </a:schemeClr>
-              </a:buClr>
-              <a:buSzPct val="70000"/>
-              <a:buFont typeface="Wingdings 2" pitchFamily="18" charset="2"/>
-              <a:buNone/>
-            </a:pPr>
-            <a:r>
-              <a:rPr lang="en-US" sz="2800" b="1" dirty="0" smtClean="0">
-                <a:solidFill>
-                  <a:srgbClr val="8CF4F2"/>
-                </a:solidFill>
-                <a:effectLst>
-                  <a:outerShdw blurRad="38100" dist="38100" dir="2700000" algn="tl">
-                    <a:srgbClr val="000000">
-                      <a:alpha val="43137"/>
-                    </a:srgbClr>
-                  </a:outerShdw>
-                </a:effectLst>
-                <a:latin typeface="Consolas" pitchFamily="49" charset="0"/>
-                <a:cs typeface="Consolas" pitchFamily="49" charset="0"/>
-                <a:hlinkClick r:id="rId3"/>
-              </a:rPr>
-              <a:t>academy@telerik.com</a:t>
-            </a:r>
-            <a:endParaRPr lang="en-US" sz="2800" b="1" dirty="0">
-              <a:solidFill>
-                <a:srgbClr val="8CF4F2"/>
-              </a:solidFill>
-              <a:effectLst>
-                <a:outerShdw blurRad="38100" dist="38100" dir="2700000" algn="tl">
-                  <a:srgbClr val="000000">
-                    <a:alpha val="43137"/>
-                  </a:srgbClr>
-                </a:outerShdw>
-              </a:effectLst>
-              <a:latin typeface="Consolas" pitchFamily="49" charset="0"/>
-              <a:cs typeface="Consolas" pitchFamily="49" charset="0"/>
-            </a:endParaRPr>
-          </a:p>
-        </p:txBody>
-      </p:sp>
     </p:spTree>
     <p:extLst>
       <p:ext uri="{BB962C8B-B14F-4D97-AF65-F5344CB8AC3E}">
-        <p14:creationId xmlns:p14="http://schemas.microsoft.com/office/powerpoint/2010/main" val="652486721"/>
+        <p14:creationId xmlns:p14="http://schemas.microsoft.com/office/powerpoint/2010/main" val="1690801263"/>
       </p:ext>
     </p:extLst>
   </p:cSld>
   <p:clrMapOvr>
     <a:masterClrMapping/>
   </p:clrMapOvr>
-  <p:timing>
-    <p:tnLst>
-      <p:par>
-        <p:cTn id="1" dur="indefinite" restart="never" nodeType="tmRoot"/>
-      </p:par>
-    </p:tnLst>
-  </p:timing>
 </p:sld>
 </file>
 

</xml_diff>